<commit_message>
Work on week 4
</commit_message>
<xml_diff>
--- a/Week 4/ValleyIsleAquatics.pptx
+++ b/Week 4/ValleyIsleAquatics.pptx
@@ -6,6 +6,7 @@
   </p:sldMasterIdLst>
   <p:sldIdLst>
     <p:sldId id="256" r:id="rId2"/>
+    <p:sldId id="257" r:id="rId3"/>
   </p:sldIdLst>
   <p:sldSz cx="12192000" cy="6858000"/>
   <p:notesSz cx="6858000" cy="9144000"/>
@@ -104,6 +105,11 @@
       </a:defRPr>
     </a:lvl9pPr>
   </p:defaultTextStyle>
+  <p:extLst>
+    <p:ext uri="{EFAFB233-063F-42B5-8137-9DF3F51BA10A}">
+      <p15:sldGuideLst xmlns:p15="http://schemas.microsoft.com/office/powerpoint/2012/main"/>
+    </p:ext>
+  </p:extLst>
 </p:presentation>
 </file>
 
@@ -278,7 +284,7 @@
           <a:p>
             <a:fld id="{48A87A34-81AB-432B-8DAE-1953F412C126}" type="datetimeFigureOut">
               <a:rPr lang="en-US" smtClean="0"/>
-              <a:t>2/4/2020</a:t>
+              <a:t>2/5/2020</a:t>
             </a:fld>
             <a:endParaRPr lang="en-US" dirty="0"/>
           </a:p>
@@ -593,7 +599,7 @@
           <a:p>
             <a:fld id="{48A87A34-81AB-432B-8DAE-1953F412C126}" type="datetimeFigureOut">
               <a:rPr lang="en-US" smtClean="0"/>
-              <a:t>2/4/2020</a:t>
+              <a:t>2/5/2020</a:t>
             </a:fld>
             <a:endParaRPr lang="en-US" dirty="0"/>
           </a:p>
@@ -815,7 +821,7 @@
           <a:p>
             <a:fld id="{48A87A34-81AB-432B-8DAE-1953F412C126}" type="datetimeFigureOut">
               <a:rPr lang="en-US" smtClean="0"/>
-              <a:t>2/4/2020</a:t>
+              <a:t>2/5/2020</a:t>
             </a:fld>
             <a:endParaRPr lang="en-US" dirty="0"/>
           </a:p>
@@ -1106,7 +1112,7 @@
           <a:p>
             <a:fld id="{48A87A34-81AB-432B-8DAE-1953F412C126}" type="datetimeFigureOut">
               <a:rPr lang="en-US" smtClean="0"/>
-              <a:t>2/4/2020</a:t>
+              <a:t>2/5/2020</a:t>
             </a:fld>
             <a:endParaRPr lang="en-US" dirty="0"/>
           </a:p>
@@ -1560,7 +1566,7 @@
           <a:p>
             <a:fld id="{48A87A34-81AB-432B-8DAE-1953F412C126}" type="datetimeFigureOut">
               <a:rPr lang="en-US" smtClean="0"/>
-              <a:t>2/4/2020</a:t>
+              <a:t>2/5/2020</a:t>
             </a:fld>
             <a:endParaRPr lang="en-US" dirty="0"/>
           </a:p>
@@ -2136,7 +2142,7 @@
           <a:p>
             <a:fld id="{48A87A34-81AB-432B-8DAE-1953F412C126}" type="datetimeFigureOut">
               <a:rPr lang="en-US" smtClean="0"/>
-              <a:t>2/4/2020</a:t>
+              <a:t>2/5/2020</a:t>
             </a:fld>
             <a:endParaRPr lang="en-US" dirty="0"/>
           </a:p>
@@ -2997,7 +3003,7 @@
           <a:p>
             <a:fld id="{48A87A34-81AB-432B-8DAE-1953F412C126}" type="datetimeFigureOut">
               <a:rPr lang="en-US" smtClean="0"/>
-              <a:t>2/4/2020</a:t>
+              <a:t>2/5/2020</a:t>
             </a:fld>
             <a:endParaRPr lang="en-US" dirty="0"/>
           </a:p>
@@ -3202,7 +3208,7 @@
           <a:p>
             <a:fld id="{48A87A34-81AB-432B-8DAE-1953F412C126}" type="datetimeFigureOut">
               <a:rPr lang="en-US" smtClean="0"/>
-              <a:t>2/4/2020</a:t>
+              <a:t>2/5/2020</a:t>
             </a:fld>
             <a:endParaRPr lang="en-US" dirty="0"/>
           </a:p>
@@ -3416,7 +3422,7 @@
           <a:p>
             <a:fld id="{48A87A34-81AB-432B-8DAE-1953F412C126}" type="datetimeFigureOut">
               <a:rPr lang="en-US" smtClean="0"/>
-              <a:t>2/4/2020</a:t>
+              <a:t>2/5/2020</a:t>
             </a:fld>
             <a:endParaRPr lang="en-US" dirty="0"/>
           </a:p>
@@ -3621,7 +3627,7 @@
           <a:p>
             <a:fld id="{48A87A34-81AB-432B-8DAE-1953F412C126}" type="datetimeFigureOut">
               <a:rPr lang="en-US" smtClean="0"/>
-              <a:t>2/4/2020</a:t>
+              <a:t>2/5/2020</a:t>
             </a:fld>
             <a:endParaRPr lang="en-US" dirty="0"/>
           </a:p>
@@ -3901,7 +3907,7 @@
           <a:p>
             <a:fld id="{48A87A34-81AB-432B-8DAE-1953F412C126}" type="datetimeFigureOut">
               <a:rPr lang="en-US" smtClean="0"/>
-              <a:t>2/4/2020</a:t>
+              <a:t>2/5/2020</a:t>
             </a:fld>
             <a:endParaRPr lang="en-US" dirty="0"/>
           </a:p>
@@ -4168,7 +4174,7 @@
           <a:p>
             <a:fld id="{48A87A34-81AB-432B-8DAE-1953F412C126}" type="datetimeFigureOut">
               <a:rPr lang="en-US" smtClean="0"/>
-              <a:t>2/4/2020</a:t>
+              <a:t>2/5/2020</a:t>
             </a:fld>
             <a:endParaRPr lang="en-US" dirty="0"/>
           </a:p>
@@ -4583,7 +4589,7 @@
           <a:p>
             <a:fld id="{48A87A34-81AB-432B-8DAE-1953F412C126}" type="datetimeFigureOut">
               <a:rPr lang="en-US" smtClean="0"/>
-              <a:t>2/4/2020</a:t>
+              <a:t>2/5/2020</a:t>
             </a:fld>
             <a:endParaRPr lang="en-US" dirty="0"/>
           </a:p>
@@ -4731,7 +4737,7 @@
           <a:p>
             <a:fld id="{48A87A34-81AB-432B-8DAE-1953F412C126}" type="datetimeFigureOut">
               <a:rPr lang="en-US" smtClean="0"/>
-              <a:t>2/4/2020</a:t>
+              <a:t>2/5/2020</a:t>
             </a:fld>
             <a:endParaRPr lang="en-US" dirty="0"/>
           </a:p>
@@ -4856,7 +4862,7 @@
           <a:p>
             <a:fld id="{48A87A34-81AB-432B-8DAE-1953F412C126}" type="datetimeFigureOut">
               <a:rPr lang="en-US" smtClean="0"/>
-              <a:t>2/4/2020</a:t>
+              <a:t>2/5/2020</a:t>
             </a:fld>
             <a:endParaRPr lang="en-US" dirty="0"/>
           </a:p>
@@ -5135,7 +5141,7 @@
           <a:p>
             <a:fld id="{48A87A34-81AB-432B-8DAE-1953F412C126}" type="datetimeFigureOut">
               <a:rPr lang="en-US" smtClean="0"/>
-              <a:t>2/4/2020</a:t>
+              <a:t>2/5/2020</a:t>
             </a:fld>
             <a:endParaRPr lang="en-US" dirty="0"/>
           </a:p>
@@ -5450,7 +5456,7 @@
           <a:p>
             <a:fld id="{48A87A34-81AB-432B-8DAE-1953F412C126}" type="datetimeFigureOut">
               <a:rPr lang="en-US" smtClean="0"/>
-              <a:t>2/4/2020</a:t>
+              <a:t>2/5/2020</a:t>
             </a:fld>
             <a:endParaRPr lang="en-US" dirty="0"/>
           </a:p>
@@ -5704,7 +5710,7 @@
             <a:fld id="{48A87A34-81AB-432B-8DAE-1953F412C126}" type="datetimeFigureOut">
               <a:rPr lang="en-US" smtClean="0"/>
               <a:pPr/>
-              <a:t>2/4/2020</a:t>
+              <a:t>2/5/2020</a:t>
             </a:fld>
             <a:endParaRPr lang="en-US" dirty="0"/>
           </a:p>
@@ -6200,7 +6206,10 @@
           <a:bodyPr/>
           <a:lstStyle/>
           <a:p>
-            <a:endParaRPr lang="en-US" dirty="0"/>
+            <a:r>
+              <a:rPr lang="en-US" dirty="0"/>
+              <a:t>Web Proposal</a:t>
+            </a:r>
           </a:p>
         </p:txBody>
       </p:sp>
@@ -6215,6 +6224,2012 @@
     <a:masterClrMapping/>
   </p:clrMapOvr>
 </p:sld>
+</file>
+
+<file path=ppt/slides/slide2.xml><?xml version="1.0" encoding="utf-8"?>
+<p:sld xmlns:a="http://schemas.openxmlformats.org/drawingml/2006/main" xmlns:r="http://schemas.openxmlformats.org/officeDocument/2006/relationships" xmlns:p="http://schemas.openxmlformats.org/presentationml/2006/main">
+  <p:cSld>
+    <p:spTree>
+      <p:nvGrpSpPr>
+        <p:cNvPr id="1" name=""/>
+        <p:cNvGrpSpPr/>
+        <p:nvPr/>
+      </p:nvGrpSpPr>
+      <p:grpSpPr>
+        <a:xfrm>
+          <a:off x="0" y="0"/>
+          <a:ext cx="0" cy="0"/>
+          <a:chOff x="0" y="0"/>
+          <a:chExt cx="0" cy="0"/>
+        </a:xfrm>
+      </p:grpSpPr>
+      <p:sp>
+        <p:nvSpPr>
+          <p:cNvPr id="2" name="Title 1">
+            <a:extLst>
+              <a:ext uri="{FF2B5EF4-FFF2-40B4-BE49-F238E27FC236}">
+                <a16:creationId xmlns:a16="http://schemas.microsoft.com/office/drawing/2014/main" id="{A9672703-90CC-40B0-9810-87EEB0DD87C7}"/>
+              </a:ext>
+            </a:extLst>
+          </p:cNvPr>
+          <p:cNvSpPr>
+            <a:spLocks noGrp="1"/>
+          </p:cNvSpPr>
+          <p:nvPr>
+            <p:ph type="title"/>
+          </p:nvPr>
+        </p:nvSpPr>
+        <p:spPr>
+          <a:xfrm>
+            <a:off x="913775" y="618517"/>
+            <a:ext cx="10364451" cy="834363"/>
+          </a:xfrm>
+        </p:spPr>
+        <p:txBody>
+          <a:bodyPr/>
+          <a:lstStyle/>
+          <a:p>
+            <a:r>
+              <a:rPr lang="en-US" dirty="0">
+                <a:latin typeface="Mufferaw Rg" panose="03080602050302020201" pitchFamily="66" charset="0"/>
+              </a:rPr>
+              <a:t>Home Page</a:t>
+            </a:r>
+          </a:p>
+        </p:txBody>
+      </p:sp>
+      <p:grpSp>
+        <p:nvGrpSpPr>
+          <p:cNvPr id="4" name="Browser" descr="&lt;SmartSettings&gt;&lt;SmartResize enabled=&quot;True&quot; minWidth=&quot;140&quot; minHeight=&quot;50&quot; /&gt;&lt;/SmartSettings&gt;">
+            <a:extLst>
+              <a:ext uri="{FF2B5EF4-FFF2-40B4-BE49-F238E27FC236}">
+                <a16:creationId xmlns:a16="http://schemas.microsoft.com/office/drawing/2014/main" id="{31558702-9BEE-4302-AE8B-ECF14E3D5932}"/>
+              </a:ext>
+            </a:extLst>
+          </p:cNvPr>
+          <p:cNvGrpSpPr/>
+          <p:nvPr>
+            <p:custDataLst>
+              <p:tags r:id="rId1"/>
+            </p:custDataLst>
+          </p:nvPr>
+        </p:nvGrpSpPr>
+        <p:grpSpPr>
+          <a:xfrm>
+            <a:off x="913775" y="1572260"/>
+            <a:ext cx="10363826" cy="4338320"/>
+            <a:chOff x="595684" y="1261242"/>
+            <a:chExt cx="6668462" cy="4352544"/>
+          </a:xfrm>
+        </p:grpSpPr>
+        <p:sp>
+          <p:nvSpPr>
+            <p:cNvPr id="5" name="Window Body" descr="&lt;SmartSettings&gt;&lt;SmartResize anchorLeft=&quot;Absolute&quot; anchorTop=&quot;Absolute&quot; anchorRight=&quot;Absolute&quot; anchorBottom=&quot;Absolute&quot; /&gt;&lt;/SmartSettings&gt;">
+              <a:extLst>
+                <a:ext uri="{FF2B5EF4-FFF2-40B4-BE49-F238E27FC236}">
+                  <a16:creationId xmlns:a16="http://schemas.microsoft.com/office/drawing/2014/main" id="{F0D317C7-AC91-47D0-B305-17C2EDEF853C}"/>
+                </a:ext>
+              </a:extLst>
+            </p:cNvPr>
+            <p:cNvSpPr/>
+            <p:nvPr>
+              <p:custDataLst>
+                <p:tags r:id="rId2"/>
+              </p:custDataLst>
+            </p:nvPr>
+          </p:nvSpPr>
+          <p:spPr>
+            <a:xfrm>
+              <a:off x="595684" y="1797980"/>
+              <a:ext cx="6668462" cy="3815806"/>
+            </a:xfrm>
+            <a:prstGeom prst="rect">
+              <a:avLst/>
+            </a:prstGeom>
+            <a:solidFill>
+              <a:srgbClr val="FFFFFF"/>
+            </a:solidFill>
+            <a:ln w="6350">
+              <a:solidFill>
+                <a:srgbClr val="808080"/>
+              </a:solidFill>
+            </a:ln>
+          </p:spPr>
+          <p:style>
+            <a:lnRef idx="2">
+              <a:schemeClr val="accent1">
+                <a:shade val="50000"/>
+              </a:schemeClr>
+            </a:lnRef>
+            <a:fillRef idx="1">
+              <a:schemeClr val="accent1"/>
+            </a:fillRef>
+            <a:effectRef idx="0">
+              <a:schemeClr val="accent1"/>
+            </a:effectRef>
+            <a:fontRef idx="minor">
+              <a:schemeClr val="lt1"/>
+            </a:fontRef>
+          </p:style>
+          <p:txBody>
+            <a:bodyPr rot="0" spcFirstLastPara="0" vert="horz" wrap="square" lIns="91440" tIns="45720" rIns="91440" bIns="45720" numCol="1" spcCol="0" rtlCol="0" fromWordArt="0" anchor="ctr" anchorCtr="0" forceAA="0" compatLnSpc="1">
+              <a:prstTxWarp prst="textNoShape">
+                <a:avLst/>
+              </a:prstTxWarp>
+              <a:noAutofit/>
+            </a:bodyPr>
+            <a:lstStyle>
+              <a:defPPr>
+                <a:defRPr lang="en-US"/>
+              </a:defPPr>
+              <a:lvl1pPr marL="0" algn="l" defTabSz="914400" rtl="0" eaLnBrk="1" latinLnBrk="0" hangingPunct="1">
+                <a:defRPr sz="1800" kern="1200">
+                  <a:solidFill>
+                    <a:schemeClr val="lt1"/>
+                  </a:solidFill>
+                  <a:latin typeface="+mn-lt"/>
+                  <a:ea typeface="+mn-ea"/>
+                  <a:cs typeface="+mn-cs"/>
+                </a:defRPr>
+              </a:lvl1pPr>
+              <a:lvl2pPr marL="457200" algn="l" defTabSz="914400" rtl="0" eaLnBrk="1" latinLnBrk="0" hangingPunct="1">
+                <a:defRPr sz="1800" kern="1200">
+                  <a:solidFill>
+                    <a:schemeClr val="lt1"/>
+                  </a:solidFill>
+                  <a:latin typeface="+mn-lt"/>
+                  <a:ea typeface="+mn-ea"/>
+                  <a:cs typeface="+mn-cs"/>
+                </a:defRPr>
+              </a:lvl2pPr>
+              <a:lvl3pPr marL="914400" algn="l" defTabSz="914400" rtl="0" eaLnBrk="1" latinLnBrk="0" hangingPunct="1">
+                <a:defRPr sz="1800" kern="1200">
+                  <a:solidFill>
+                    <a:schemeClr val="lt1"/>
+                  </a:solidFill>
+                  <a:latin typeface="+mn-lt"/>
+                  <a:ea typeface="+mn-ea"/>
+                  <a:cs typeface="+mn-cs"/>
+                </a:defRPr>
+              </a:lvl3pPr>
+              <a:lvl4pPr marL="1371600" algn="l" defTabSz="914400" rtl="0" eaLnBrk="1" latinLnBrk="0" hangingPunct="1">
+                <a:defRPr sz="1800" kern="1200">
+                  <a:solidFill>
+                    <a:schemeClr val="lt1"/>
+                  </a:solidFill>
+                  <a:latin typeface="+mn-lt"/>
+                  <a:ea typeface="+mn-ea"/>
+                  <a:cs typeface="+mn-cs"/>
+                </a:defRPr>
+              </a:lvl4pPr>
+              <a:lvl5pPr marL="1828800" algn="l" defTabSz="914400" rtl="0" eaLnBrk="1" latinLnBrk="0" hangingPunct="1">
+                <a:defRPr sz="1800" kern="1200">
+                  <a:solidFill>
+                    <a:schemeClr val="lt1"/>
+                  </a:solidFill>
+                  <a:latin typeface="+mn-lt"/>
+                  <a:ea typeface="+mn-ea"/>
+                  <a:cs typeface="+mn-cs"/>
+                </a:defRPr>
+              </a:lvl5pPr>
+              <a:lvl6pPr marL="2286000" algn="l" defTabSz="914400" rtl="0" eaLnBrk="1" latinLnBrk="0" hangingPunct="1">
+                <a:defRPr sz="1800" kern="1200">
+                  <a:solidFill>
+                    <a:schemeClr val="lt1"/>
+                  </a:solidFill>
+                  <a:latin typeface="+mn-lt"/>
+                  <a:ea typeface="+mn-ea"/>
+                  <a:cs typeface="+mn-cs"/>
+                </a:defRPr>
+              </a:lvl6pPr>
+              <a:lvl7pPr marL="2743200" algn="l" defTabSz="914400" rtl="0" eaLnBrk="1" latinLnBrk="0" hangingPunct="1">
+                <a:defRPr sz="1800" kern="1200">
+                  <a:solidFill>
+                    <a:schemeClr val="lt1"/>
+                  </a:solidFill>
+                  <a:latin typeface="+mn-lt"/>
+                  <a:ea typeface="+mn-ea"/>
+                  <a:cs typeface="+mn-cs"/>
+                </a:defRPr>
+              </a:lvl7pPr>
+              <a:lvl8pPr marL="3200400" algn="l" defTabSz="914400" rtl="0" eaLnBrk="1" latinLnBrk="0" hangingPunct="1">
+                <a:defRPr sz="1800" kern="1200">
+                  <a:solidFill>
+                    <a:schemeClr val="lt1"/>
+                  </a:solidFill>
+                  <a:latin typeface="+mn-lt"/>
+                  <a:ea typeface="+mn-ea"/>
+                  <a:cs typeface="+mn-cs"/>
+                </a:defRPr>
+              </a:lvl8pPr>
+              <a:lvl9pPr marL="3657600" algn="l" defTabSz="914400" rtl="0" eaLnBrk="1" latinLnBrk="0" hangingPunct="1">
+                <a:defRPr sz="1800" kern="1200">
+                  <a:solidFill>
+                    <a:schemeClr val="lt1"/>
+                  </a:solidFill>
+                  <a:latin typeface="+mn-lt"/>
+                  <a:ea typeface="+mn-ea"/>
+                  <a:cs typeface="+mn-cs"/>
+                </a:defRPr>
+              </a:lvl9pPr>
+            </a:lstStyle>
+            <a:p>
+              <a:pPr algn="ctr"/>
+              <a:endParaRPr lang="en-US" sz="900" dirty="0">
+                <a:solidFill>
+                  <a:srgbClr val="5F5F5F"/>
+                </a:solidFill>
+                <a:latin typeface="Segoe UI" panose="020B0502040204020203" pitchFamily="34" charset="0"/>
+                <a:cs typeface="Segoe UI" panose="020B0502040204020203" pitchFamily="34" charset="0"/>
+              </a:endParaRPr>
+            </a:p>
+          </p:txBody>
+        </p:sp>
+        <p:sp>
+          <p:nvSpPr>
+            <p:cNvPr id="6" name="Title Bar" descr="&lt;SmartSettings&gt;&lt;SmartResize anchorLeft=&quot;Absolute&quot; anchorTop=&quot;Absolute&quot; anchorRight=&quot;Absolute&quot; anchorBottom=&quot;None&quot; /&gt;&lt;/SmartSettings&gt;">
+              <a:extLst>
+                <a:ext uri="{FF2B5EF4-FFF2-40B4-BE49-F238E27FC236}">
+                  <a16:creationId xmlns:a16="http://schemas.microsoft.com/office/drawing/2014/main" id="{213781B3-C509-4025-82B6-5014DAAE2C55}"/>
+                </a:ext>
+              </a:extLst>
+            </p:cNvPr>
+            <p:cNvSpPr/>
+            <p:nvPr>
+              <p:custDataLst>
+                <p:tags r:id="rId3"/>
+              </p:custDataLst>
+            </p:nvPr>
+          </p:nvSpPr>
+          <p:spPr>
+            <a:xfrm>
+              <a:off x="595684" y="1261242"/>
+              <a:ext cx="6668461" cy="538839"/>
+            </a:xfrm>
+            <a:prstGeom prst="rect">
+              <a:avLst/>
+            </a:prstGeom>
+            <a:solidFill>
+              <a:srgbClr val="FFFFFF"/>
+            </a:solidFill>
+            <a:ln w="6350">
+              <a:solidFill>
+                <a:srgbClr val="808080"/>
+              </a:solidFill>
+            </a:ln>
+          </p:spPr>
+          <p:style>
+            <a:lnRef idx="2">
+              <a:schemeClr val="accent1">
+                <a:shade val="50000"/>
+              </a:schemeClr>
+            </a:lnRef>
+            <a:fillRef idx="1">
+              <a:schemeClr val="accent1"/>
+            </a:fillRef>
+            <a:effectRef idx="0">
+              <a:schemeClr val="accent1"/>
+            </a:effectRef>
+            <a:fontRef idx="minor">
+              <a:schemeClr val="lt1"/>
+            </a:fontRef>
+          </p:style>
+          <p:txBody>
+            <a:bodyPr rot="0" spcFirstLastPara="0" vert="horz" wrap="square" lIns="91440" tIns="45720" rIns="228600" bIns="45720" numCol="1" spcCol="0" rtlCol="0" fromWordArt="0" anchor="t" anchorCtr="0" forceAA="0" compatLnSpc="1">
+              <a:prstTxWarp prst="textNoShape">
+                <a:avLst/>
+              </a:prstTxWarp>
+              <a:noAutofit/>
+            </a:bodyPr>
+            <a:lstStyle>
+              <a:defPPr>
+                <a:defRPr lang="en-US"/>
+              </a:defPPr>
+              <a:lvl1pPr marL="0" algn="l" defTabSz="914400" rtl="0" eaLnBrk="1" latinLnBrk="0" hangingPunct="1">
+                <a:defRPr sz="1800" kern="1200">
+                  <a:solidFill>
+                    <a:schemeClr val="lt1"/>
+                  </a:solidFill>
+                  <a:latin typeface="+mn-lt"/>
+                  <a:ea typeface="+mn-ea"/>
+                  <a:cs typeface="+mn-cs"/>
+                </a:defRPr>
+              </a:lvl1pPr>
+              <a:lvl2pPr marL="457200" algn="l" defTabSz="914400" rtl="0" eaLnBrk="1" latinLnBrk="0" hangingPunct="1">
+                <a:defRPr sz="1800" kern="1200">
+                  <a:solidFill>
+                    <a:schemeClr val="lt1"/>
+                  </a:solidFill>
+                  <a:latin typeface="+mn-lt"/>
+                  <a:ea typeface="+mn-ea"/>
+                  <a:cs typeface="+mn-cs"/>
+                </a:defRPr>
+              </a:lvl2pPr>
+              <a:lvl3pPr marL="914400" algn="l" defTabSz="914400" rtl="0" eaLnBrk="1" latinLnBrk="0" hangingPunct="1">
+                <a:defRPr sz="1800" kern="1200">
+                  <a:solidFill>
+                    <a:schemeClr val="lt1"/>
+                  </a:solidFill>
+                  <a:latin typeface="+mn-lt"/>
+                  <a:ea typeface="+mn-ea"/>
+                  <a:cs typeface="+mn-cs"/>
+                </a:defRPr>
+              </a:lvl3pPr>
+              <a:lvl4pPr marL="1371600" algn="l" defTabSz="914400" rtl="0" eaLnBrk="1" latinLnBrk="0" hangingPunct="1">
+                <a:defRPr sz="1800" kern="1200">
+                  <a:solidFill>
+                    <a:schemeClr val="lt1"/>
+                  </a:solidFill>
+                  <a:latin typeface="+mn-lt"/>
+                  <a:ea typeface="+mn-ea"/>
+                  <a:cs typeface="+mn-cs"/>
+                </a:defRPr>
+              </a:lvl4pPr>
+              <a:lvl5pPr marL="1828800" algn="l" defTabSz="914400" rtl="0" eaLnBrk="1" latinLnBrk="0" hangingPunct="1">
+                <a:defRPr sz="1800" kern="1200">
+                  <a:solidFill>
+                    <a:schemeClr val="lt1"/>
+                  </a:solidFill>
+                  <a:latin typeface="+mn-lt"/>
+                  <a:ea typeface="+mn-ea"/>
+                  <a:cs typeface="+mn-cs"/>
+                </a:defRPr>
+              </a:lvl5pPr>
+              <a:lvl6pPr marL="2286000" algn="l" defTabSz="914400" rtl="0" eaLnBrk="1" latinLnBrk="0" hangingPunct="1">
+                <a:defRPr sz="1800" kern="1200">
+                  <a:solidFill>
+                    <a:schemeClr val="lt1"/>
+                  </a:solidFill>
+                  <a:latin typeface="+mn-lt"/>
+                  <a:ea typeface="+mn-ea"/>
+                  <a:cs typeface="+mn-cs"/>
+                </a:defRPr>
+              </a:lvl6pPr>
+              <a:lvl7pPr marL="2743200" algn="l" defTabSz="914400" rtl="0" eaLnBrk="1" latinLnBrk="0" hangingPunct="1">
+                <a:defRPr sz="1800" kern="1200">
+                  <a:solidFill>
+                    <a:schemeClr val="lt1"/>
+                  </a:solidFill>
+                  <a:latin typeface="+mn-lt"/>
+                  <a:ea typeface="+mn-ea"/>
+                  <a:cs typeface="+mn-cs"/>
+                </a:defRPr>
+              </a:lvl7pPr>
+              <a:lvl8pPr marL="3200400" algn="l" defTabSz="914400" rtl="0" eaLnBrk="1" latinLnBrk="0" hangingPunct="1">
+                <a:defRPr sz="1800" kern="1200">
+                  <a:solidFill>
+                    <a:schemeClr val="lt1"/>
+                  </a:solidFill>
+                  <a:latin typeface="+mn-lt"/>
+                  <a:ea typeface="+mn-ea"/>
+                  <a:cs typeface="+mn-cs"/>
+                </a:defRPr>
+              </a:lvl8pPr>
+              <a:lvl9pPr marL="3657600" algn="l" defTabSz="914400" rtl="0" eaLnBrk="1" latinLnBrk="0" hangingPunct="1">
+                <a:defRPr sz="1800" kern="1200">
+                  <a:solidFill>
+                    <a:schemeClr val="lt1"/>
+                  </a:solidFill>
+                  <a:latin typeface="+mn-lt"/>
+                  <a:ea typeface="+mn-ea"/>
+                  <a:cs typeface="+mn-cs"/>
+                </a:defRPr>
+              </a:lvl9pPr>
+            </a:lstStyle>
+            <a:p>
+              <a:r>
+                <a:rPr lang="en-US" sz="900" dirty="0">
+                  <a:solidFill>
+                    <a:srgbClr val="5F5F5F"/>
+                  </a:solidFill>
+                  <a:latin typeface="Segoe UI" panose="020B0502040204020203" pitchFamily="34" charset="0"/>
+                  <a:cs typeface="Segoe UI" panose="020B0502040204020203" pitchFamily="34" charset="0"/>
+                </a:rPr>
+                <a:t>Browser</a:t>
+              </a:r>
+            </a:p>
+          </p:txBody>
+        </p:sp>
+        <p:sp>
+          <p:nvSpPr>
+            <p:cNvPr id="7" name="Menu Button" descr="&lt;SmartSettings&gt;&lt;SmartResize anchorLeft=&quot;None&quot; anchorTop=&quot;Absolute&quot; anchorRight=&quot;Absolute&quot; anchorBottom=&quot;None&quot; /&gt;&lt;/SmartSettings&gt;">
+              <a:extLst>
+                <a:ext uri="{FF2B5EF4-FFF2-40B4-BE49-F238E27FC236}">
+                  <a16:creationId xmlns:a16="http://schemas.microsoft.com/office/drawing/2014/main" id="{18D4ABB3-BFC6-4CB4-9D58-3ACB868C355B}"/>
+                </a:ext>
+              </a:extLst>
+            </p:cNvPr>
+            <p:cNvSpPr>
+              <a:spLocks noChangeAspect="1" noEditPoints="1"/>
+            </p:cNvSpPr>
+            <p:nvPr>
+              <p:custDataLst>
+                <p:tags r:id="rId4"/>
+              </p:custDataLst>
+            </p:nvPr>
+          </p:nvSpPr>
+          <p:spPr bwMode="auto">
+            <a:xfrm>
+              <a:off x="7111085" y="1569810"/>
+              <a:ext cx="96017" cy="113083"/>
+            </a:xfrm>
+            <a:custGeom>
+              <a:avLst/>
+              <a:gdLst>
+                <a:gd name="T0" fmla="*/ 0 w 415"/>
+                <a:gd name="T1" fmla="*/ 309 h 309"/>
+                <a:gd name="T2" fmla="*/ 415 w 415"/>
+                <a:gd name="T3" fmla="*/ 309 h 309"/>
+                <a:gd name="T4" fmla="*/ 0 w 415"/>
+                <a:gd name="T5" fmla="*/ 155 h 309"/>
+                <a:gd name="T6" fmla="*/ 415 w 415"/>
+                <a:gd name="T7" fmla="*/ 155 h 309"/>
+                <a:gd name="T8" fmla="*/ 0 w 415"/>
+                <a:gd name="T9" fmla="*/ 0 h 309"/>
+                <a:gd name="T10" fmla="*/ 415 w 415"/>
+                <a:gd name="T11" fmla="*/ 0 h 309"/>
+              </a:gdLst>
+              <a:ahLst/>
+              <a:cxnLst>
+                <a:cxn ang="0">
+                  <a:pos x="T0" y="T1"/>
+                </a:cxn>
+                <a:cxn ang="0">
+                  <a:pos x="T2" y="T3"/>
+                </a:cxn>
+                <a:cxn ang="0">
+                  <a:pos x="T4" y="T5"/>
+                </a:cxn>
+                <a:cxn ang="0">
+                  <a:pos x="T6" y="T7"/>
+                </a:cxn>
+                <a:cxn ang="0">
+                  <a:pos x="T8" y="T9"/>
+                </a:cxn>
+                <a:cxn ang="0">
+                  <a:pos x="T10" y="T11"/>
+                </a:cxn>
+              </a:cxnLst>
+              <a:rect l="0" t="0" r="r" b="b"/>
+              <a:pathLst>
+                <a:path w="415" h="309">
+                  <a:moveTo>
+                    <a:pt x="0" y="309"/>
+                  </a:moveTo>
+                  <a:lnTo>
+                    <a:pt x="415" y="309"/>
+                  </a:lnTo>
+                  <a:moveTo>
+                    <a:pt x="0" y="155"/>
+                  </a:moveTo>
+                  <a:lnTo>
+                    <a:pt x="415" y="155"/>
+                  </a:lnTo>
+                  <a:moveTo>
+                    <a:pt x="0" y="0"/>
+                  </a:moveTo>
+                  <a:lnTo>
+                    <a:pt x="415" y="0"/>
+                  </a:lnTo>
+                </a:path>
+              </a:pathLst>
+            </a:custGeom>
+            <a:noFill/>
+            <a:ln w="6350" cap="flat">
+              <a:solidFill>
+                <a:srgbClr val="808080"/>
+              </a:solidFill>
+              <a:prstDash val="solid"/>
+              <a:miter lim="800000"/>
+              <a:headEnd/>
+              <a:tailEnd/>
+            </a:ln>
+            <a:extLst>
+              <a:ext uri="{909E8E84-426E-40DD-AFC4-6F175D3DCCD1}">
+                <a14:hiddenFill xmlns:a14="http://schemas.microsoft.com/office/drawing/2010/main">
+                  <a:solidFill>
+                    <a:srgbClr val="FFFFFF"/>
+                  </a:solidFill>
+                </a14:hiddenFill>
+              </a:ext>
+            </a:extLst>
+          </p:spPr>
+          <p:txBody>
+            <a:bodyPr vert="horz" wrap="square" lIns="91440" tIns="45720" rIns="91440" bIns="45720" numCol="1" anchor="t" anchorCtr="0" compatLnSpc="1">
+              <a:prstTxWarp prst="textNoShape">
+                <a:avLst/>
+              </a:prstTxWarp>
+            </a:bodyPr>
+            <a:lstStyle>
+              <a:defPPr>
+                <a:defRPr lang="en-US"/>
+              </a:defPPr>
+              <a:lvl1pPr marL="0" algn="l" defTabSz="914400" rtl="0" eaLnBrk="1" latinLnBrk="0" hangingPunct="1">
+                <a:defRPr sz="1800" kern="1200">
+                  <a:solidFill>
+                    <a:schemeClr val="tx1"/>
+                  </a:solidFill>
+                  <a:latin typeface="+mn-lt"/>
+                  <a:ea typeface="+mn-ea"/>
+                  <a:cs typeface="+mn-cs"/>
+                </a:defRPr>
+              </a:lvl1pPr>
+              <a:lvl2pPr marL="457200" algn="l" defTabSz="914400" rtl="0" eaLnBrk="1" latinLnBrk="0" hangingPunct="1">
+                <a:defRPr sz="1800" kern="1200">
+                  <a:solidFill>
+                    <a:schemeClr val="tx1"/>
+                  </a:solidFill>
+                  <a:latin typeface="+mn-lt"/>
+                  <a:ea typeface="+mn-ea"/>
+                  <a:cs typeface="+mn-cs"/>
+                </a:defRPr>
+              </a:lvl2pPr>
+              <a:lvl3pPr marL="914400" algn="l" defTabSz="914400" rtl="0" eaLnBrk="1" latinLnBrk="0" hangingPunct="1">
+                <a:defRPr sz="1800" kern="1200">
+                  <a:solidFill>
+                    <a:schemeClr val="tx1"/>
+                  </a:solidFill>
+                  <a:latin typeface="+mn-lt"/>
+                  <a:ea typeface="+mn-ea"/>
+                  <a:cs typeface="+mn-cs"/>
+                </a:defRPr>
+              </a:lvl3pPr>
+              <a:lvl4pPr marL="1371600" algn="l" defTabSz="914400" rtl="0" eaLnBrk="1" latinLnBrk="0" hangingPunct="1">
+                <a:defRPr sz="1800" kern="1200">
+                  <a:solidFill>
+                    <a:schemeClr val="tx1"/>
+                  </a:solidFill>
+                  <a:latin typeface="+mn-lt"/>
+                  <a:ea typeface="+mn-ea"/>
+                  <a:cs typeface="+mn-cs"/>
+                </a:defRPr>
+              </a:lvl4pPr>
+              <a:lvl5pPr marL="1828800" algn="l" defTabSz="914400" rtl="0" eaLnBrk="1" latinLnBrk="0" hangingPunct="1">
+                <a:defRPr sz="1800" kern="1200">
+                  <a:solidFill>
+                    <a:schemeClr val="tx1"/>
+                  </a:solidFill>
+                  <a:latin typeface="+mn-lt"/>
+                  <a:ea typeface="+mn-ea"/>
+                  <a:cs typeface="+mn-cs"/>
+                </a:defRPr>
+              </a:lvl5pPr>
+              <a:lvl6pPr marL="2286000" algn="l" defTabSz="914400" rtl="0" eaLnBrk="1" latinLnBrk="0" hangingPunct="1">
+                <a:defRPr sz="1800" kern="1200">
+                  <a:solidFill>
+                    <a:schemeClr val="tx1"/>
+                  </a:solidFill>
+                  <a:latin typeface="+mn-lt"/>
+                  <a:ea typeface="+mn-ea"/>
+                  <a:cs typeface="+mn-cs"/>
+                </a:defRPr>
+              </a:lvl6pPr>
+              <a:lvl7pPr marL="2743200" algn="l" defTabSz="914400" rtl="0" eaLnBrk="1" latinLnBrk="0" hangingPunct="1">
+                <a:defRPr sz="1800" kern="1200">
+                  <a:solidFill>
+                    <a:schemeClr val="tx1"/>
+                  </a:solidFill>
+                  <a:latin typeface="+mn-lt"/>
+                  <a:ea typeface="+mn-ea"/>
+                  <a:cs typeface="+mn-cs"/>
+                </a:defRPr>
+              </a:lvl7pPr>
+              <a:lvl8pPr marL="3200400" algn="l" defTabSz="914400" rtl="0" eaLnBrk="1" latinLnBrk="0" hangingPunct="1">
+                <a:defRPr sz="1800" kern="1200">
+                  <a:solidFill>
+                    <a:schemeClr val="tx1"/>
+                  </a:solidFill>
+                  <a:latin typeface="+mn-lt"/>
+                  <a:ea typeface="+mn-ea"/>
+                  <a:cs typeface="+mn-cs"/>
+                </a:defRPr>
+              </a:lvl8pPr>
+              <a:lvl9pPr marL="3657600" algn="l" defTabSz="914400" rtl="0" eaLnBrk="1" latinLnBrk="0" hangingPunct="1">
+                <a:defRPr sz="1800" kern="1200">
+                  <a:solidFill>
+                    <a:schemeClr val="tx1"/>
+                  </a:solidFill>
+                  <a:latin typeface="+mn-lt"/>
+                  <a:ea typeface="+mn-ea"/>
+                  <a:cs typeface="+mn-cs"/>
+                </a:defRPr>
+              </a:lvl9pPr>
+            </a:lstStyle>
+            <a:p>
+              <a:endParaRPr lang="en-US">
+                <a:solidFill>
+                  <a:srgbClr val="5F5F5F"/>
+                </a:solidFill>
+                <a:latin typeface="Segoe UI" panose="020B0502040204020203" pitchFamily="34" charset="0"/>
+                <a:cs typeface="Segoe UI" panose="020B0502040204020203" pitchFamily="34" charset="0"/>
+              </a:endParaRPr>
+            </a:p>
+          </p:txBody>
+        </p:sp>
+        <p:sp>
+          <p:nvSpPr>
+            <p:cNvPr id="8" name="Close Button" descr="&lt;SmartSettings&gt;&lt;SmartResize anchorLeft=&quot;None&quot; anchorTop=&quot;Absolute&quot; anchorRight=&quot;Absolute&quot; anchorBottom=&quot;None&quot; /&gt;&lt;/SmartSettings&gt;">
+              <a:extLst>
+                <a:ext uri="{FF2B5EF4-FFF2-40B4-BE49-F238E27FC236}">
+                  <a16:creationId xmlns:a16="http://schemas.microsoft.com/office/drawing/2014/main" id="{5FD27152-6F08-475A-B45B-C226BB3C26A4}"/>
+                </a:ext>
+              </a:extLst>
+            </p:cNvPr>
+            <p:cNvSpPr>
+              <a:spLocks noEditPoints="1"/>
+            </p:cNvSpPr>
+            <p:nvPr>
+              <p:custDataLst>
+                <p:tags r:id="rId5"/>
+              </p:custDataLst>
+            </p:nvPr>
+          </p:nvSpPr>
+          <p:spPr bwMode="auto">
+            <a:xfrm>
+              <a:off x="7128455" y="1332723"/>
+              <a:ext cx="63331" cy="95562"/>
+            </a:xfrm>
+            <a:custGeom>
+              <a:avLst/>
+              <a:gdLst>
+                <a:gd name="T0" fmla="*/ 254 w 254"/>
+                <a:gd name="T1" fmla="*/ 0 h 254"/>
+                <a:gd name="T2" fmla="*/ 0 w 254"/>
+                <a:gd name="T3" fmla="*/ 254 h 254"/>
+                <a:gd name="T4" fmla="*/ 0 w 254"/>
+                <a:gd name="T5" fmla="*/ 0 h 254"/>
+                <a:gd name="T6" fmla="*/ 254 w 254"/>
+                <a:gd name="T7" fmla="*/ 254 h 254"/>
+              </a:gdLst>
+              <a:ahLst/>
+              <a:cxnLst>
+                <a:cxn ang="0">
+                  <a:pos x="T0" y="T1"/>
+                </a:cxn>
+                <a:cxn ang="0">
+                  <a:pos x="T2" y="T3"/>
+                </a:cxn>
+                <a:cxn ang="0">
+                  <a:pos x="T4" y="T5"/>
+                </a:cxn>
+                <a:cxn ang="0">
+                  <a:pos x="T6" y="T7"/>
+                </a:cxn>
+              </a:cxnLst>
+              <a:rect l="0" t="0" r="r" b="b"/>
+              <a:pathLst>
+                <a:path w="254" h="254">
+                  <a:moveTo>
+                    <a:pt x="254" y="0"/>
+                  </a:moveTo>
+                  <a:lnTo>
+                    <a:pt x="0" y="254"/>
+                  </a:lnTo>
+                  <a:moveTo>
+                    <a:pt x="0" y="0"/>
+                  </a:moveTo>
+                  <a:lnTo>
+                    <a:pt x="254" y="254"/>
+                  </a:lnTo>
+                </a:path>
+              </a:pathLst>
+            </a:custGeom>
+            <a:noFill/>
+            <a:ln w="9525" cap="flat">
+              <a:solidFill>
+                <a:srgbClr val="808080"/>
+              </a:solidFill>
+              <a:prstDash val="solid"/>
+              <a:miter lim="800000"/>
+              <a:headEnd/>
+              <a:tailEnd/>
+            </a:ln>
+            <a:extLst>
+              <a:ext uri="{909E8E84-426E-40DD-AFC4-6F175D3DCCD1}">
+                <a14:hiddenFill xmlns:a14="http://schemas.microsoft.com/office/drawing/2010/main">
+                  <a:solidFill>
+                    <a:srgbClr val="FFFFFF"/>
+                  </a:solidFill>
+                </a14:hiddenFill>
+              </a:ext>
+            </a:extLst>
+          </p:spPr>
+          <p:txBody>
+            <a:bodyPr vert="horz" wrap="square" lIns="91440" tIns="45720" rIns="91440" bIns="45720" numCol="1" anchor="t" anchorCtr="0" compatLnSpc="1">
+              <a:prstTxWarp prst="textNoShape">
+                <a:avLst/>
+              </a:prstTxWarp>
+            </a:bodyPr>
+            <a:lstStyle>
+              <a:defPPr>
+                <a:defRPr lang="en-US"/>
+              </a:defPPr>
+              <a:lvl1pPr marL="0" algn="l" defTabSz="914400" rtl="0" eaLnBrk="1" latinLnBrk="0" hangingPunct="1">
+                <a:defRPr sz="1800" kern="1200">
+                  <a:solidFill>
+                    <a:schemeClr val="tx1"/>
+                  </a:solidFill>
+                  <a:latin typeface="+mn-lt"/>
+                  <a:ea typeface="+mn-ea"/>
+                  <a:cs typeface="+mn-cs"/>
+                </a:defRPr>
+              </a:lvl1pPr>
+              <a:lvl2pPr marL="457200" algn="l" defTabSz="914400" rtl="0" eaLnBrk="1" latinLnBrk="0" hangingPunct="1">
+                <a:defRPr sz="1800" kern="1200">
+                  <a:solidFill>
+                    <a:schemeClr val="tx1"/>
+                  </a:solidFill>
+                  <a:latin typeface="+mn-lt"/>
+                  <a:ea typeface="+mn-ea"/>
+                  <a:cs typeface="+mn-cs"/>
+                </a:defRPr>
+              </a:lvl2pPr>
+              <a:lvl3pPr marL="914400" algn="l" defTabSz="914400" rtl="0" eaLnBrk="1" latinLnBrk="0" hangingPunct="1">
+                <a:defRPr sz="1800" kern="1200">
+                  <a:solidFill>
+                    <a:schemeClr val="tx1"/>
+                  </a:solidFill>
+                  <a:latin typeface="+mn-lt"/>
+                  <a:ea typeface="+mn-ea"/>
+                  <a:cs typeface="+mn-cs"/>
+                </a:defRPr>
+              </a:lvl3pPr>
+              <a:lvl4pPr marL="1371600" algn="l" defTabSz="914400" rtl="0" eaLnBrk="1" latinLnBrk="0" hangingPunct="1">
+                <a:defRPr sz="1800" kern="1200">
+                  <a:solidFill>
+                    <a:schemeClr val="tx1"/>
+                  </a:solidFill>
+                  <a:latin typeface="+mn-lt"/>
+                  <a:ea typeface="+mn-ea"/>
+                  <a:cs typeface="+mn-cs"/>
+                </a:defRPr>
+              </a:lvl4pPr>
+              <a:lvl5pPr marL="1828800" algn="l" defTabSz="914400" rtl="0" eaLnBrk="1" latinLnBrk="0" hangingPunct="1">
+                <a:defRPr sz="1800" kern="1200">
+                  <a:solidFill>
+                    <a:schemeClr val="tx1"/>
+                  </a:solidFill>
+                  <a:latin typeface="+mn-lt"/>
+                  <a:ea typeface="+mn-ea"/>
+                  <a:cs typeface="+mn-cs"/>
+                </a:defRPr>
+              </a:lvl5pPr>
+              <a:lvl6pPr marL="2286000" algn="l" defTabSz="914400" rtl="0" eaLnBrk="1" latinLnBrk="0" hangingPunct="1">
+                <a:defRPr sz="1800" kern="1200">
+                  <a:solidFill>
+                    <a:schemeClr val="tx1"/>
+                  </a:solidFill>
+                  <a:latin typeface="+mn-lt"/>
+                  <a:ea typeface="+mn-ea"/>
+                  <a:cs typeface="+mn-cs"/>
+                </a:defRPr>
+              </a:lvl6pPr>
+              <a:lvl7pPr marL="2743200" algn="l" defTabSz="914400" rtl="0" eaLnBrk="1" latinLnBrk="0" hangingPunct="1">
+                <a:defRPr sz="1800" kern="1200">
+                  <a:solidFill>
+                    <a:schemeClr val="tx1"/>
+                  </a:solidFill>
+                  <a:latin typeface="+mn-lt"/>
+                  <a:ea typeface="+mn-ea"/>
+                  <a:cs typeface="+mn-cs"/>
+                </a:defRPr>
+              </a:lvl7pPr>
+              <a:lvl8pPr marL="3200400" algn="l" defTabSz="914400" rtl="0" eaLnBrk="1" latinLnBrk="0" hangingPunct="1">
+                <a:defRPr sz="1800" kern="1200">
+                  <a:solidFill>
+                    <a:schemeClr val="tx1"/>
+                  </a:solidFill>
+                  <a:latin typeface="+mn-lt"/>
+                  <a:ea typeface="+mn-ea"/>
+                  <a:cs typeface="+mn-cs"/>
+                </a:defRPr>
+              </a:lvl8pPr>
+              <a:lvl9pPr marL="3657600" algn="l" defTabSz="914400" rtl="0" eaLnBrk="1" latinLnBrk="0" hangingPunct="1">
+                <a:defRPr sz="1800" kern="1200">
+                  <a:solidFill>
+                    <a:schemeClr val="tx1"/>
+                  </a:solidFill>
+                  <a:latin typeface="+mn-lt"/>
+                  <a:ea typeface="+mn-ea"/>
+                  <a:cs typeface="+mn-cs"/>
+                </a:defRPr>
+              </a:lvl9pPr>
+            </a:lstStyle>
+            <a:p>
+              <a:endParaRPr lang="en-US">
+                <a:solidFill>
+                  <a:srgbClr val="5F5F5F"/>
+                </a:solidFill>
+                <a:latin typeface="Segoe UI" panose="020B0502040204020203" pitchFamily="34" charset="0"/>
+                <a:cs typeface="Segoe UI" panose="020B0502040204020203" pitchFamily="34" charset="0"/>
+              </a:endParaRPr>
+            </a:p>
+          </p:txBody>
+        </p:sp>
+        <p:sp>
+          <p:nvSpPr>
+            <p:cNvPr id="9" name="Address Box" descr="&lt;SmartSettings&gt;&lt;SmartResize anchorLeft=&quot;Absolute&quot; anchorTop=&quot;Absolute&quot; anchorRight=&quot;Absolute&quot; anchorBottom=&quot;None&quot; /&gt;&lt;/SmartSettings&gt;">
+              <a:extLst>
+                <a:ext uri="{FF2B5EF4-FFF2-40B4-BE49-F238E27FC236}">
+                  <a16:creationId xmlns:a16="http://schemas.microsoft.com/office/drawing/2014/main" id="{7C0D5F21-AF04-4555-A820-0675BDCB5297}"/>
+                </a:ext>
+              </a:extLst>
+            </p:cNvPr>
+            <p:cNvSpPr/>
+            <p:nvPr>
+              <p:custDataLst>
+                <p:tags r:id="rId6"/>
+              </p:custDataLst>
+            </p:nvPr>
+          </p:nvSpPr>
+          <p:spPr>
+            <a:xfrm>
+              <a:off x="1176652" y="1507089"/>
+              <a:ext cx="5877387" cy="238523"/>
+            </a:xfrm>
+            <a:prstGeom prst="rect">
+              <a:avLst/>
+            </a:prstGeom>
+            <a:solidFill>
+              <a:srgbClr val="FFFFFF"/>
+            </a:solidFill>
+            <a:ln w="6350">
+              <a:solidFill>
+                <a:srgbClr val="808080"/>
+              </a:solidFill>
+            </a:ln>
+          </p:spPr>
+          <p:style>
+            <a:lnRef idx="2">
+              <a:schemeClr val="accent1">
+                <a:shade val="50000"/>
+              </a:schemeClr>
+            </a:lnRef>
+            <a:fillRef idx="1">
+              <a:schemeClr val="accent1"/>
+            </a:fillRef>
+            <a:effectRef idx="0">
+              <a:schemeClr val="accent1"/>
+            </a:effectRef>
+            <a:fontRef idx="minor">
+              <a:schemeClr val="lt1"/>
+            </a:fontRef>
+          </p:style>
+          <p:txBody>
+            <a:bodyPr rot="0" spcFirstLastPara="0" vert="horz" wrap="square" lIns="237744" tIns="45720" rIns="91440" bIns="45720" numCol="1" spcCol="0" rtlCol="0" fromWordArt="0" anchor="ctr" anchorCtr="0" forceAA="0" compatLnSpc="1">
+              <a:prstTxWarp prst="textNoShape">
+                <a:avLst/>
+              </a:prstTxWarp>
+              <a:noAutofit/>
+            </a:bodyPr>
+            <a:lstStyle>
+              <a:defPPr>
+                <a:defRPr lang="en-US"/>
+              </a:defPPr>
+              <a:lvl1pPr marL="0" algn="l" defTabSz="914400" rtl="0" eaLnBrk="1" latinLnBrk="0" hangingPunct="1">
+                <a:defRPr sz="1800" kern="1200">
+                  <a:solidFill>
+                    <a:schemeClr val="lt1"/>
+                  </a:solidFill>
+                  <a:latin typeface="+mn-lt"/>
+                  <a:ea typeface="+mn-ea"/>
+                  <a:cs typeface="+mn-cs"/>
+                </a:defRPr>
+              </a:lvl1pPr>
+              <a:lvl2pPr marL="457200" algn="l" defTabSz="914400" rtl="0" eaLnBrk="1" latinLnBrk="0" hangingPunct="1">
+                <a:defRPr sz="1800" kern="1200">
+                  <a:solidFill>
+                    <a:schemeClr val="lt1"/>
+                  </a:solidFill>
+                  <a:latin typeface="+mn-lt"/>
+                  <a:ea typeface="+mn-ea"/>
+                  <a:cs typeface="+mn-cs"/>
+                </a:defRPr>
+              </a:lvl2pPr>
+              <a:lvl3pPr marL="914400" algn="l" defTabSz="914400" rtl="0" eaLnBrk="1" latinLnBrk="0" hangingPunct="1">
+                <a:defRPr sz="1800" kern="1200">
+                  <a:solidFill>
+                    <a:schemeClr val="lt1"/>
+                  </a:solidFill>
+                  <a:latin typeface="+mn-lt"/>
+                  <a:ea typeface="+mn-ea"/>
+                  <a:cs typeface="+mn-cs"/>
+                </a:defRPr>
+              </a:lvl3pPr>
+              <a:lvl4pPr marL="1371600" algn="l" defTabSz="914400" rtl="0" eaLnBrk="1" latinLnBrk="0" hangingPunct="1">
+                <a:defRPr sz="1800" kern="1200">
+                  <a:solidFill>
+                    <a:schemeClr val="lt1"/>
+                  </a:solidFill>
+                  <a:latin typeface="+mn-lt"/>
+                  <a:ea typeface="+mn-ea"/>
+                  <a:cs typeface="+mn-cs"/>
+                </a:defRPr>
+              </a:lvl4pPr>
+              <a:lvl5pPr marL="1828800" algn="l" defTabSz="914400" rtl="0" eaLnBrk="1" latinLnBrk="0" hangingPunct="1">
+                <a:defRPr sz="1800" kern="1200">
+                  <a:solidFill>
+                    <a:schemeClr val="lt1"/>
+                  </a:solidFill>
+                  <a:latin typeface="+mn-lt"/>
+                  <a:ea typeface="+mn-ea"/>
+                  <a:cs typeface="+mn-cs"/>
+                </a:defRPr>
+              </a:lvl5pPr>
+              <a:lvl6pPr marL="2286000" algn="l" defTabSz="914400" rtl="0" eaLnBrk="1" latinLnBrk="0" hangingPunct="1">
+                <a:defRPr sz="1800" kern="1200">
+                  <a:solidFill>
+                    <a:schemeClr val="lt1"/>
+                  </a:solidFill>
+                  <a:latin typeface="+mn-lt"/>
+                  <a:ea typeface="+mn-ea"/>
+                  <a:cs typeface="+mn-cs"/>
+                </a:defRPr>
+              </a:lvl6pPr>
+              <a:lvl7pPr marL="2743200" algn="l" defTabSz="914400" rtl="0" eaLnBrk="1" latinLnBrk="0" hangingPunct="1">
+                <a:defRPr sz="1800" kern="1200">
+                  <a:solidFill>
+                    <a:schemeClr val="lt1"/>
+                  </a:solidFill>
+                  <a:latin typeface="+mn-lt"/>
+                  <a:ea typeface="+mn-ea"/>
+                  <a:cs typeface="+mn-cs"/>
+                </a:defRPr>
+              </a:lvl7pPr>
+              <a:lvl8pPr marL="3200400" algn="l" defTabSz="914400" rtl="0" eaLnBrk="1" latinLnBrk="0" hangingPunct="1">
+                <a:defRPr sz="1800" kern="1200">
+                  <a:solidFill>
+                    <a:schemeClr val="lt1"/>
+                  </a:solidFill>
+                  <a:latin typeface="+mn-lt"/>
+                  <a:ea typeface="+mn-ea"/>
+                  <a:cs typeface="+mn-cs"/>
+                </a:defRPr>
+              </a:lvl8pPr>
+              <a:lvl9pPr marL="3657600" algn="l" defTabSz="914400" rtl="0" eaLnBrk="1" latinLnBrk="0" hangingPunct="1">
+                <a:defRPr sz="1800" kern="1200">
+                  <a:solidFill>
+                    <a:schemeClr val="lt1"/>
+                  </a:solidFill>
+                  <a:latin typeface="+mn-lt"/>
+                  <a:ea typeface="+mn-ea"/>
+                  <a:cs typeface="+mn-cs"/>
+                </a:defRPr>
+              </a:lvl9pPr>
+            </a:lstStyle>
+            <a:p>
+              <a:r>
+                <a:rPr lang="en-US" sz="900" noProof="1">
+                  <a:solidFill>
+                    <a:srgbClr val="5F5F5F"/>
+                  </a:solidFill>
+                  <a:latin typeface="Segoe UI" panose="020B0502040204020203" pitchFamily="34" charset="0"/>
+                  <a:cs typeface="Segoe UI" panose="020B0502040204020203" pitchFamily="34" charset="0"/>
+                </a:rPr>
+                <a:t>www.valleyisleaquatics.com</a:t>
+              </a:r>
+            </a:p>
+          </p:txBody>
+        </p:sp>
+        <p:sp>
+          <p:nvSpPr>
+            <p:cNvPr id="10" name="Document Icon" descr="&lt;SmartSettings&gt;&lt;SmartResize anchorLeft=&quot;Absolute&quot; anchorTop=&quot;Absolute&quot; anchorRight=&quot;None&quot; anchorBottom=&quot;None&quot; /&gt;&lt;/SmartSettings&gt;">
+              <a:extLst>
+                <a:ext uri="{FF2B5EF4-FFF2-40B4-BE49-F238E27FC236}">
+                  <a16:creationId xmlns:a16="http://schemas.microsoft.com/office/drawing/2014/main" id="{B8108D7E-23BA-4736-A946-47B2C7DA1285}"/>
+                </a:ext>
+              </a:extLst>
+            </p:cNvPr>
+            <p:cNvSpPr>
+              <a:spLocks noChangeAspect="1" noEditPoints="1"/>
+            </p:cNvSpPr>
+            <p:nvPr>
+              <p:custDataLst>
+                <p:tags r:id="rId7"/>
+              </p:custDataLst>
+            </p:nvPr>
+          </p:nvSpPr>
+          <p:spPr bwMode="auto">
+            <a:xfrm>
+              <a:off x="1225634" y="1559458"/>
+              <a:ext cx="60266" cy="133787"/>
+            </a:xfrm>
+            <a:custGeom>
+              <a:avLst/>
+              <a:gdLst>
+                <a:gd name="T0" fmla="*/ 153 w 260"/>
+                <a:gd name="T1" fmla="*/ 7 h 367"/>
+                <a:gd name="T2" fmla="*/ 153 w 260"/>
+                <a:gd name="T3" fmla="*/ 108 h 367"/>
+                <a:gd name="T4" fmla="*/ 253 w 260"/>
+                <a:gd name="T5" fmla="*/ 108 h 367"/>
+                <a:gd name="T6" fmla="*/ 0 w 260"/>
+                <a:gd name="T7" fmla="*/ 0 h 367"/>
+                <a:gd name="T8" fmla="*/ 0 w 260"/>
+                <a:gd name="T9" fmla="*/ 367 h 367"/>
+                <a:gd name="T10" fmla="*/ 260 w 260"/>
+                <a:gd name="T11" fmla="*/ 367 h 367"/>
+                <a:gd name="T12" fmla="*/ 260 w 260"/>
+                <a:gd name="T13" fmla="*/ 100 h 367"/>
+                <a:gd name="T14" fmla="*/ 161 w 260"/>
+                <a:gd name="T15" fmla="*/ 1 h 367"/>
+                <a:gd name="T16" fmla="*/ 0 w 260"/>
+                <a:gd name="T17" fmla="*/ 0 h 367"/>
+              </a:gdLst>
+              <a:ahLst/>
+              <a:cxnLst>
+                <a:cxn ang="0">
+                  <a:pos x="T0" y="T1"/>
+                </a:cxn>
+                <a:cxn ang="0">
+                  <a:pos x="T2" y="T3"/>
+                </a:cxn>
+                <a:cxn ang="0">
+                  <a:pos x="T4" y="T5"/>
+                </a:cxn>
+                <a:cxn ang="0">
+                  <a:pos x="T6" y="T7"/>
+                </a:cxn>
+                <a:cxn ang="0">
+                  <a:pos x="T8" y="T9"/>
+                </a:cxn>
+                <a:cxn ang="0">
+                  <a:pos x="T10" y="T11"/>
+                </a:cxn>
+                <a:cxn ang="0">
+                  <a:pos x="T12" y="T13"/>
+                </a:cxn>
+                <a:cxn ang="0">
+                  <a:pos x="T14" y="T15"/>
+                </a:cxn>
+                <a:cxn ang="0">
+                  <a:pos x="T16" y="T17"/>
+                </a:cxn>
+              </a:cxnLst>
+              <a:rect l="0" t="0" r="r" b="b"/>
+              <a:pathLst>
+                <a:path w="260" h="367">
+                  <a:moveTo>
+                    <a:pt x="153" y="7"/>
+                  </a:moveTo>
+                  <a:lnTo>
+                    <a:pt x="153" y="108"/>
+                  </a:lnTo>
+                  <a:lnTo>
+                    <a:pt x="253" y="108"/>
+                  </a:lnTo>
+                  <a:moveTo>
+                    <a:pt x="0" y="0"/>
+                  </a:moveTo>
+                  <a:lnTo>
+                    <a:pt x="0" y="367"/>
+                  </a:lnTo>
+                  <a:lnTo>
+                    <a:pt x="260" y="367"/>
+                  </a:lnTo>
+                  <a:lnTo>
+                    <a:pt x="260" y="100"/>
+                  </a:lnTo>
+                  <a:lnTo>
+                    <a:pt x="161" y="1"/>
+                  </a:lnTo>
+                  <a:lnTo>
+                    <a:pt x="0" y="0"/>
+                  </a:lnTo>
+                  <a:close/>
+                </a:path>
+              </a:pathLst>
+            </a:custGeom>
+            <a:noFill/>
+            <a:ln w="6350" cap="flat">
+              <a:solidFill>
+                <a:srgbClr val="808080"/>
+              </a:solidFill>
+              <a:prstDash val="solid"/>
+              <a:miter lim="800000"/>
+              <a:headEnd/>
+              <a:tailEnd/>
+            </a:ln>
+            <a:extLst>
+              <a:ext uri="{909E8E84-426E-40DD-AFC4-6F175D3DCCD1}">
+                <a14:hiddenFill xmlns:a14="http://schemas.microsoft.com/office/drawing/2010/main">
+                  <a:solidFill>
+                    <a:srgbClr val="FFFFFF"/>
+                  </a:solidFill>
+                </a14:hiddenFill>
+              </a:ext>
+            </a:extLst>
+          </p:spPr>
+          <p:txBody>
+            <a:bodyPr vert="horz" wrap="square" lIns="91440" tIns="45720" rIns="91440" bIns="45720" numCol="1" anchor="t" anchorCtr="0" compatLnSpc="1">
+              <a:prstTxWarp prst="textNoShape">
+                <a:avLst/>
+              </a:prstTxWarp>
+            </a:bodyPr>
+            <a:lstStyle>
+              <a:defPPr>
+                <a:defRPr lang="en-US"/>
+              </a:defPPr>
+              <a:lvl1pPr marL="0" algn="l" defTabSz="914400" rtl="0" eaLnBrk="1" latinLnBrk="0" hangingPunct="1">
+                <a:defRPr sz="1800" kern="1200">
+                  <a:solidFill>
+                    <a:schemeClr val="tx1"/>
+                  </a:solidFill>
+                  <a:latin typeface="+mn-lt"/>
+                  <a:ea typeface="+mn-ea"/>
+                  <a:cs typeface="+mn-cs"/>
+                </a:defRPr>
+              </a:lvl1pPr>
+              <a:lvl2pPr marL="457200" algn="l" defTabSz="914400" rtl="0" eaLnBrk="1" latinLnBrk="0" hangingPunct="1">
+                <a:defRPr sz="1800" kern="1200">
+                  <a:solidFill>
+                    <a:schemeClr val="tx1"/>
+                  </a:solidFill>
+                  <a:latin typeface="+mn-lt"/>
+                  <a:ea typeface="+mn-ea"/>
+                  <a:cs typeface="+mn-cs"/>
+                </a:defRPr>
+              </a:lvl2pPr>
+              <a:lvl3pPr marL="914400" algn="l" defTabSz="914400" rtl="0" eaLnBrk="1" latinLnBrk="0" hangingPunct="1">
+                <a:defRPr sz="1800" kern="1200">
+                  <a:solidFill>
+                    <a:schemeClr val="tx1"/>
+                  </a:solidFill>
+                  <a:latin typeface="+mn-lt"/>
+                  <a:ea typeface="+mn-ea"/>
+                  <a:cs typeface="+mn-cs"/>
+                </a:defRPr>
+              </a:lvl3pPr>
+              <a:lvl4pPr marL="1371600" algn="l" defTabSz="914400" rtl="0" eaLnBrk="1" latinLnBrk="0" hangingPunct="1">
+                <a:defRPr sz="1800" kern="1200">
+                  <a:solidFill>
+                    <a:schemeClr val="tx1"/>
+                  </a:solidFill>
+                  <a:latin typeface="+mn-lt"/>
+                  <a:ea typeface="+mn-ea"/>
+                  <a:cs typeface="+mn-cs"/>
+                </a:defRPr>
+              </a:lvl4pPr>
+              <a:lvl5pPr marL="1828800" algn="l" defTabSz="914400" rtl="0" eaLnBrk="1" latinLnBrk="0" hangingPunct="1">
+                <a:defRPr sz="1800" kern="1200">
+                  <a:solidFill>
+                    <a:schemeClr val="tx1"/>
+                  </a:solidFill>
+                  <a:latin typeface="+mn-lt"/>
+                  <a:ea typeface="+mn-ea"/>
+                  <a:cs typeface="+mn-cs"/>
+                </a:defRPr>
+              </a:lvl5pPr>
+              <a:lvl6pPr marL="2286000" algn="l" defTabSz="914400" rtl="0" eaLnBrk="1" latinLnBrk="0" hangingPunct="1">
+                <a:defRPr sz="1800" kern="1200">
+                  <a:solidFill>
+                    <a:schemeClr val="tx1"/>
+                  </a:solidFill>
+                  <a:latin typeface="+mn-lt"/>
+                  <a:ea typeface="+mn-ea"/>
+                  <a:cs typeface="+mn-cs"/>
+                </a:defRPr>
+              </a:lvl6pPr>
+              <a:lvl7pPr marL="2743200" algn="l" defTabSz="914400" rtl="0" eaLnBrk="1" latinLnBrk="0" hangingPunct="1">
+                <a:defRPr sz="1800" kern="1200">
+                  <a:solidFill>
+                    <a:schemeClr val="tx1"/>
+                  </a:solidFill>
+                  <a:latin typeface="+mn-lt"/>
+                  <a:ea typeface="+mn-ea"/>
+                  <a:cs typeface="+mn-cs"/>
+                </a:defRPr>
+              </a:lvl7pPr>
+              <a:lvl8pPr marL="3200400" algn="l" defTabSz="914400" rtl="0" eaLnBrk="1" latinLnBrk="0" hangingPunct="1">
+                <a:defRPr sz="1800" kern="1200">
+                  <a:solidFill>
+                    <a:schemeClr val="tx1"/>
+                  </a:solidFill>
+                  <a:latin typeface="+mn-lt"/>
+                  <a:ea typeface="+mn-ea"/>
+                  <a:cs typeface="+mn-cs"/>
+                </a:defRPr>
+              </a:lvl8pPr>
+              <a:lvl9pPr marL="3657600" algn="l" defTabSz="914400" rtl="0" eaLnBrk="1" latinLnBrk="0" hangingPunct="1">
+                <a:defRPr sz="1800" kern="1200">
+                  <a:solidFill>
+                    <a:schemeClr val="tx1"/>
+                  </a:solidFill>
+                  <a:latin typeface="+mn-lt"/>
+                  <a:ea typeface="+mn-ea"/>
+                  <a:cs typeface="+mn-cs"/>
+                </a:defRPr>
+              </a:lvl9pPr>
+            </a:lstStyle>
+            <a:p>
+              <a:endParaRPr lang="en-US">
+                <a:solidFill>
+                  <a:srgbClr val="5F5F5F"/>
+                </a:solidFill>
+                <a:latin typeface="Segoe UI" panose="020B0502040204020203" pitchFamily="34" charset="0"/>
+                <a:cs typeface="Segoe UI" panose="020B0502040204020203" pitchFamily="34" charset="0"/>
+              </a:endParaRPr>
+            </a:p>
+          </p:txBody>
+        </p:sp>
+        <p:grpSp>
+          <p:nvGrpSpPr>
+            <p:cNvPr id="11" name="Navigation Buttons">
+              <a:extLst>
+                <a:ext uri="{FF2B5EF4-FFF2-40B4-BE49-F238E27FC236}">
+                  <a16:creationId xmlns:a16="http://schemas.microsoft.com/office/drawing/2014/main" id="{702FA6CF-9912-4752-A1F2-0EAF3A1A1DFA}"/>
+                </a:ext>
+              </a:extLst>
+            </p:cNvPr>
+            <p:cNvGrpSpPr/>
+            <p:nvPr/>
+          </p:nvGrpSpPr>
+          <p:grpSpPr>
+            <a:xfrm>
+              <a:off x="676702" y="1539548"/>
+              <a:ext cx="412667" cy="173605"/>
+              <a:chOff x="676702" y="1539548"/>
+              <a:chExt cx="412667" cy="173605"/>
+            </a:xfrm>
+          </p:grpSpPr>
+          <p:sp>
+            <p:nvSpPr>
+              <p:cNvPr id="12" name="Back Button" descr="&lt;SmartSettings&gt;&lt;SmartResize anchorLeft=&quot;Absolute&quot; anchorTop=&quot;Absolute&quot; anchorRight=&quot;None&quot; anchorBottom=&quot;None&quot; /&gt;&lt;/SmartSettings&gt;">
+                <a:extLst>
+                  <a:ext uri="{FF2B5EF4-FFF2-40B4-BE49-F238E27FC236}">
+                    <a16:creationId xmlns:a16="http://schemas.microsoft.com/office/drawing/2014/main" id="{3067A00B-74B5-4121-BEDB-F20D4B84AD16}"/>
+                  </a:ext>
+                </a:extLst>
+              </p:cNvPr>
+              <p:cNvSpPr>
+                <a:spLocks noChangeAspect="1" noEditPoints="1"/>
+              </p:cNvSpPr>
+              <p:nvPr>
+                <p:custDataLst>
+                  <p:tags r:id="rId8"/>
+                </p:custDataLst>
+              </p:nvPr>
+            </p:nvSpPr>
+            <p:spPr bwMode="auto">
+              <a:xfrm>
+                <a:off x="676702" y="1565828"/>
+                <a:ext cx="98060" cy="121045"/>
+              </a:xfrm>
+              <a:custGeom>
+                <a:avLst/>
+                <a:gdLst>
+                  <a:gd name="T0" fmla="*/ 159 w 423"/>
+                  <a:gd name="T1" fmla="*/ 332 h 332"/>
+                  <a:gd name="T2" fmla="*/ 0 w 423"/>
+                  <a:gd name="T3" fmla="*/ 166 h 332"/>
+                  <a:gd name="T4" fmla="*/ 159 w 423"/>
+                  <a:gd name="T5" fmla="*/ 0 h 332"/>
+                  <a:gd name="T6" fmla="*/ 15 w 423"/>
+                  <a:gd name="T7" fmla="*/ 166 h 332"/>
+                  <a:gd name="T8" fmla="*/ 423 w 423"/>
+                  <a:gd name="T9" fmla="*/ 166 h 332"/>
+                </a:gdLst>
+                <a:ahLst/>
+                <a:cxnLst>
+                  <a:cxn ang="0">
+                    <a:pos x="T0" y="T1"/>
+                  </a:cxn>
+                  <a:cxn ang="0">
+                    <a:pos x="T2" y="T3"/>
+                  </a:cxn>
+                  <a:cxn ang="0">
+                    <a:pos x="T4" y="T5"/>
+                  </a:cxn>
+                  <a:cxn ang="0">
+                    <a:pos x="T6" y="T7"/>
+                  </a:cxn>
+                  <a:cxn ang="0">
+                    <a:pos x="T8" y="T9"/>
+                  </a:cxn>
+                </a:cxnLst>
+                <a:rect l="0" t="0" r="r" b="b"/>
+                <a:pathLst>
+                  <a:path w="423" h="332">
+                    <a:moveTo>
+                      <a:pt x="159" y="332"/>
+                    </a:moveTo>
+                    <a:lnTo>
+                      <a:pt x="0" y="166"/>
+                    </a:lnTo>
+                    <a:lnTo>
+                      <a:pt x="159" y="0"/>
+                    </a:lnTo>
+                    <a:moveTo>
+                      <a:pt x="15" y="166"/>
+                    </a:moveTo>
+                    <a:lnTo>
+                      <a:pt x="423" y="166"/>
+                    </a:lnTo>
+                  </a:path>
+                </a:pathLst>
+              </a:custGeom>
+              <a:noFill/>
+              <a:ln w="6350" cap="sq">
+                <a:solidFill>
+                  <a:srgbClr val="808080"/>
+                </a:solidFill>
+                <a:prstDash val="solid"/>
+                <a:miter lim="800000"/>
+                <a:headEnd/>
+                <a:tailEnd/>
+              </a:ln>
+              <a:extLst>
+                <a:ext uri="{909E8E84-426E-40DD-AFC4-6F175D3DCCD1}">
+                  <a14:hiddenFill xmlns:a14="http://schemas.microsoft.com/office/drawing/2010/main">
+                    <a:solidFill>
+                      <a:srgbClr val="FFFFFF"/>
+                    </a:solidFill>
+                  </a14:hiddenFill>
+                </a:ext>
+              </a:extLst>
+            </p:spPr>
+            <p:txBody>
+              <a:bodyPr vert="horz" wrap="square" lIns="91440" tIns="45720" rIns="91440" bIns="45720" numCol="1" anchor="t" anchorCtr="0" compatLnSpc="1">
+                <a:prstTxWarp prst="textNoShape">
+                  <a:avLst/>
+                </a:prstTxWarp>
+              </a:bodyPr>
+              <a:lstStyle>
+                <a:defPPr>
+                  <a:defRPr lang="en-US"/>
+                </a:defPPr>
+                <a:lvl1pPr marL="0" algn="l" defTabSz="914400" rtl="0" eaLnBrk="1" latinLnBrk="0" hangingPunct="1">
+                  <a:defRPr sz="1800" kern="1200">
+                    <a:solidFill>
+                      <a:schemeClr val="tx1"/>
+                    </a:solidFill>
+                    <a:latin typeface="+mn-lt"/>
+                    <a:ea typeface="+mn-ea"/>
+                    <a:cs typeface="+mn-cs"/>
+                  </a:defRPr>
+                </a:lvl1pPr>
+                <a:lvl2pPr marL="457200" algn="l" defTabSz="914400" rtl="0" eaLnBrk="1" latinLnBrk="0" hangingPunct="1">
+                  <a:defRPr sz="1800" kern="1200">
+                    <a:solidFill>
+                      <a:schemeClr val="tx1"/>
+                    </a:solidFill>
+                    <a:latin typeface="+mn-lt"/>
+                    <a:ea typeface="+mn-ea"/>
+                    <a:cs typeface="+mn-cs"/>
+                  </a:defRPr>
+                </a:lvl2pPr>
+                <a:lvl3pPr marL="914400" algn="l" defTabSz="914400" rtl="0" eaLnBrk="1" latinLnBrk="0" hangingPunct="1">
+                  <a:defRPr sz="1800" kern="1200">
+                    <a:solidFill>
+                      <a:schemeClr val="tx1"/>
+                    </a:solidFill>
+                    <a:latin typeface="+mn-lt"/>
+                    <a:ea typeface="+mn-ea"/>
+                    <a:cs typeface="+mn-cs"/>
+                  </a:defRPr>
+                </a:lvl3pPr>
+                <a:lvl4pPr marL="1371600" algn="l" defTabSz="914400" rtl="0" eaLnBrk="1" latinLnBrk="0" hangingPunct="1">
+                  <a:defRPr sz="1800" kern="1200">
+                    <a:solidFill>
+                      <a:schemeClr val="tx1"/>
+                    </a:solidFill>
+                    <a:latin typeface="+mn-lt"/>
+                    <a:ea typeface="+mn-ea"/>
+                    <a:cs typeface="+mn-cs"/>
+                  </a:defRPr>
+                </a:lvl4pPr>
+                <a:lvl5pPr marL="1828800" algn="l" defTabSz="914400" rtl="0" eaLnBrk="1" latinLnBrk="0" hangingPunct="1">
+                  <a:defRPr sz="1800" kern="1200">
+                    <a:solidFill>
+                      <a:schemeClr val="tx1"/>
+                    </a:solidFill>
+                    <a:latin typeface="+mn-lt"/>
+                    <a:ea typeface="+mn-ea"/>
+                    <a:cs typeface="+mn-cs"/>
+                  </a:defRPr>
+                </a:lvl5pPr>
+                <a:lvl6pPr marL="2286000" algn="l" defTabSz="914400" rtl="0" eaLnBrk="1" latinLnBrk="0" hangingPunct="1">
+                  <a:defRPr sz="1800" kern="1200">
+                    <a:solidFill>
+                      <a:schemeClr val="tx1"/>
+                    </a:solidFill>
+                    <a:latin typeface="+mn-lt"/>
+                    <a:ea typeface="+mn-ea"/>
+                    <a:cs typeface="+mn-cs"/>
+                  </a:defRPr>
+                </a:lvl6pPr>
+                <a:lvl7pPr marL="2743200" algn="l" defTabSz="914400" rtl="0" eaLnBrk="1" latinLnBrk="0" hangingPunct="1">
+                  <a:defRPr sz="1800" kern="1200">
+                    <a:solidFill>
+                      <a:schemeClr val="tx1"/>
+                    </a:solidFill>
+                    <a:latin typeface="+mn-lt"/>
+                    <a:ea typeface="+mn-ea"/>
+                    <a:cs typeface="+mn-cs"/>
+                  </a:defRPr>
+                </a:lvl7pPr>
+                <a:lvl8pPr marL="3200400" algn="l" defTabSz="914400" rtl="0" eaLnBrk="1" latinLnBrk="0" hangingPunct="1">
+                  <a:defRPr sz="1800" kern="1200">
+                    <a:solidFill>
+                      <a:schemeClr val="tx1"/>
+                    </a:solidFill>
+                    <a:latin typeface="+mn-lt"/>
+                    <a:ea typeface="+mn-ea"/>
+                    <a:cs typeface="+mn-cs"/>
+                  </a:defRPr>
+                </a:lvl8pPr>
+                <a:lvl9pPr marL="3657600" algn="l" defTabSz="914400" rtl="0" eaLnBrk="1" latinLnBrk="0" hangingPunct="1">
+                  <a:defRPr sz="1800" kern="1200">
+                    <a:solidFill>
+                      <a:schemeClr val="tx1"/>
+                    </a:solidFill>
+                    <a:latin typeface="+mn-lt"/>
+                    <a:ea typeface="+mn-ea"/>
+                    <a:cs typeface="+mn-cs"/>
+                  </a:defRPr>
+                </a:lvl9pPr>
+              </a:lstStyle>
+              <a:p>
+                <a:endParaRPr lang="en-US">
+                  <a:solidFill>
+                    <a:srgbClr val="5F5F5F"/>
+                  </a:solidFill>
+                  <a:latin typeface="Segoe UI" panose="020B0502040204020203" pitchFamily="34" charset="0"/>
+                  <a:cs typeface="Segoe UI" panose="020B0502040204020203" pitchFamily="34" charset="0"/>
+                </a:endParaRPr>
+              </a:p>
+            </p:txBody>
+          </p:sp>
+          <p:sp>
+            <p:nvSpPr>
+              <p:cNvPr id="13" name="Forward Button" descr="&lt;SmartSettings&gt;&lt;SmartResize anchorLeft=&quot;Absolute&quot; anchorTop=&quot;Absolute&quot; anchorRight=&quot;None&quot; anchorBottom=&quot;None&quot; /&gt;&lt;/SmartSettings&gt;">
+                <a:extLst>
+                  <a:ext uri="{FF2B5EF4-FFF2-40B4-BE49-F238E27FC236}">
+                    <a16:creationId xmlns:a16="http://schemas.microsoft.com/office/drawing/2014/main" id="{9EE08B58-5B3F-49D4-B872-4F6D0BF3DFA4}"/>
+                  </a:ext>
+                </a:extLst>
+              </p:cNvPr>
+              <p:cNvSpPr>
+                <a:spLocks noChangeAspect="1" noEditPoints="1"/>
+              </p:cNvSpPr>
+              <p:nvPr>
+                <p:custDataLst>
+                  <p:tags r:id="rId9"/>
+                </p:custDataLst>
+              </p:nvPr>
+            </p:nvSpPr>
+            <p:spPr bwMode="auto">
+              <a:xfrm>
+                <a:off x="831963" y="1565828"/>
+                <a:ext cx="98060" cy="121045"/>
+              </a:xfrm>
+              <a:custGeom>
+                <a:avLst/>
+                <a:gdLst>
+                  <a:gd name="T0" fmla="*/ 265 w 423"/>
+                  <a:gd name="T1" fmla="*/ 0 h 332"/>
+                  <a:gd name="T2" fmla="*/ 423 w 423"/>
+                  <a:gd name="T3" fmla="*/ 166 h 332"/>
+                  <a:gd name="T4" fmla="*/ 265 w 423"/>
+                  <a:gd name="T5" fmla="*/ 332 h 332"/>
+                  <a:gd name="T6" fmla="*/ 408 w 423"/>
+                  <a:gd name="T7" fmla="*/ 166 h 332"/>
+                  <a:gd name="T8" fmla="*/ 0 w 423"/>
+                  <a:gd name="T9" fmla="*/ 166 h 332"/>
+                </a:gdLst>
+                <a:ahLst/>
+                <a:cxnLst>
+                  <a:cxn ang="0">
+                    <a:pos x="T0" y="T1"/>
+                  </a:cxn>
+                  <a:cxn ang="0">
+                    <a:pos x="T2" y="T3"/>
+                  </a:cxn>
+                  <a:cxn ang="0">
+                    <a:pos x="T4" y="T5"/>
+                  </a:cxn>
+                  <a:cxn ang="0">
+                    <a:pos x="T6" y="T7"/>
+                  </a:cxn>
+                  <a:cxn ang="0">
+                    <a:pos x="T8" y="T9"/>
+                  </a:cxn>
+                </a:cxnLst>
+                <a:rect l="0" t="0" r="r" b="b"/>
+                <a:pathLst>
+                  <a:path w="423" h="332">
+                    <a:moveTo>
+                      <a:pt x="265" y="0"/>
+                    </a:moveTo>
+                    <a:lnTo>
+                      <a:pt x="423" y="166"/>
+                    </a:lnTo>
+                    <a:lnTo>
+                      <a:pt x="265" y="332"/>
+                    </a:lnTo>
+                    <a:moveTo>
+                      <a:pt x="408" y="166"/>
+                    </a:moveTo>
+                    <a:lnTo>
+                      <a:pt x="0" y="166"/>
+                    </a:lnTo>
+                  </a:path>
+                </a:pathLst>
+              </a:custGeom>
+              <a:noFill/>
+              <a:ln w="6350" cap="sq">
+                <a:solidFill>
+                  <a:srgbClr val="808080"/>
+                </a:solidFill>
+                <a:prstDash val="solid"/>
+                <a:miter lim="800000"/>
+                <a:headEnd/>
+                <a:tailEnd/>
+              </a:ln>
+              <a:extLst>
+                <a:ext uri="{909E8E84-426E-40DD-AFC4-6F175D3DCCD1}">
+                  <a14:hiddenFill xmlns:a14="http://schemas.microsoft.com/office/drawing/2010/main">
+                    <a:solidFill>
+                      <a:srgbClr val="FFFFFF"/>
+                    </a:solidFill>
+                  </a14:hiddenFill>
+                </a:ext>
+              </a:extLst>
+            </p:spPr>
+            <p:txBody>
+              <a:bodyPr vert="horz" wrap="square" lIns="91440" tIns="45720" rIns="91440" bIns="45720" numCol="1" anchor="t" anchorCtr="0" compatLnSpc="1">
+                <a:prstTxWarp prst="textNoShape">
+                  <a:avLst/>
+                </a:prstTxWarp>
+              </a:bodyPr>
+              <a:lstStyle>
+                <a:defPPr>
+                  <a:defRPr lang="en-US"/>
+                </a:defPPr>
+                <a:lvl1pPr marL="0" algn="l" defTabSz="914400" rtl="0" eaLnBrk="1" latinLnBrk="0" hangingPunct="1">
+                  <a:defRPr sz="1800" kern="1200">
+                    <a:solidFill>
+                      <a:schemeClr val="tx1"/>
+                    </a:solidFill>
+                    <a:latin typeface="+mn-lt"/>
+                    <a:ea typeface="+mn-ea"/>
+                    <a:cs typeface="+mn-cs"/>
+                  </a:defRPr>
+                </a:lvl1pPr>
+                <a:lvl2pPr marL="457200" algn="l" defTabSz="914400" rtl="0" eaLnBrk="1" latinLnBrk="0" hangingPunct="1">
+                  <a:defRPr sz="1800" kern="1200">
+                    <a:solidFill>
+                      <a:schemeClr val="tx1"/>
+                    </a:solidFill>
+                    <a:latin typeface="+mn-lt"/>
+                    <a:ea typeface="+mn-ea"/>
+                    <a:cs typeface="+mn-cs"/>
+                  </a:defRPr>
+                </a:lvl2pPr>
+                <a:lvl3pPr marL="914400" algn="l" defTabSz="914400" rtl="0" eaLnBrk="1" latinLnBrk="0" hangingPunct="1">
+                  <a:defRPr sz="1800" kern="1200">
+                    <a:solidFill>
+                      <a:schemeClr val="tx1"/>
+                    </a:solidFill>
+                    <a:latin typeface="+mn-lt"/>
+                    <a:ea typeface="+mn-ea"/>
+                    <a:cs typeface="+mn-cs"/>
+                  </a:defRPr>
+                </a:lvl3pPr>
+                <a:lvl4pPr marL="1371600" algn="l" defTabSz="914400" rtl="0" eaLnBrk="1" latinLnBrk="0" hangingPunct="1">
+                  <a:defRPr sz="1800" kern="1200">
+                    <a:solidFill>
+                      <a:schemeClr val="tx1"/>
+                    </a:solidFill>
+                    <a:latin typeface="+mn-lt"/>
+                    <a:ea typeface="+mn-ea"/>
+                    <a:cs typeface="+mn-cs"/>
+                  </a:defRPr>
+                </a:lvl4pPr>
+                <a:lvl5pPr marL="1828800" algn="l" defTabSz="914400" rtl="0" eaLnBrk="1" latinLnBrk="0" hangingPunct="1">
+                  <a:defRPr sz="1800" kern="1200">
+                    <a:solidFill>
+                      <a:schemeClr val="tx1"/>
+                    </a:solidFill>
+                    <a:latin typeface="+mn-lt"/>
+                    <a:ea typeface="+mn-ea"/>
+                    <a:cs typeface="+mn-cs"/>
+                  </a:defRPr>
+                </a:lvl5pPr>
+                <a:lvl6pPr marL="2286000" algn="l" defTabSz="914400" rtl="0" eaLnBrk="1" latinLnBrk="0" hangingPunct="1">
+                  <a:defRPr sz="1800" kern="1200">
+                    <a:solidFill>
+                      <a:schemeClr val="tx1"/>
+                    </a:solidFill>
+                    <a:latin typeface="+mn-lt"/>
+                    <a:ea typeface="+mn-ea"/>
+                    <a:cs typeface="+mn-cs"/>
+                  </a:defRPr>
+                </a:lvl6pPr>
+                <a:lvl7pPr marL="2743200" algn="l" defTabSz="914400" rtl="0" eaLnBrk="1" latinLnBrk="0" hangingPunct="1">
+                  <a:defRPr sz="1800" kern="1200">
+                    <a:solidFill>
+                      <a:schemeClr val="tx1"/>
+                    </a:solidFill>
+                    <a:latin typeface="+mn-lt"/>
+                    <a:ea typeface="+mn-ea"/>
+                    <a:cs typeface="+mn-cs"/>
+                  </a:defRPr>
+                </a:lvl7pPr>
+                <a:lvl8pPr marL="3200400" algn="l" defTabSz="914400" rtl="0" eaLnBrk="1" latinLnBrk="0" hangingPunct="1">
+                  <a:defRPr sz="1800" kern="1200">
+                    <a:solidFill>
+                      <a:schemeClr val="tx1"/>
+                    </a:solidFill>
+                    <a:latin typeface="+mn-lt"/>
+                    <a:ea typeface="+mn-ea"/>
+                    <a:cs typeface="+mn-cs"/>
+                  </a:defRPr>
+                </a:lvl8pPr>
+                <a:lvl9pPr marL="3657600" algn="l" defTabSz="914400" rtl="0" eaLnBrk="1" latinLnBrk="0" hangingPunct="1">
+                  <a:defRPr sz="1800" kern="1200">
+                    <a:solidFill>
+                      <a:schemeClr val="tx1"/>
+                    </a:solidFill>
+                    <a:latin typeface="+mn-lt"/>
+                    <a:ea typeface="+mn-ea"/>
+                    <a:cs typeface="+mn-cs"/>
+                  </a:defRPr>
+                </a:lvl9pPr>
+              </a:lstStyle>
+              <a:p>
+                <a:endParaRPr lang="en-US">
+                  <a:solidFill>
+                    <a:srgbClr val="5F5F5F"/>
+                  </a:solidFill>
+                  <a:latin typeface="Segoe UI" panose="020B0502040204020203" pitchFamily="34" charset="0"/>
+                  <a:cs typeface="Segoe UI" panose="020B0502040204020203" pitchFamily="34" charset="0"/>
+                </a:endParaRPr>
+              </a:p>
+            </p:txBody>
+          </p:sp>
+          <p:sp>
+            <p:nvSpPr>
+              <p:cNvPr id="14" name="Reload Button" descr="&lt;SmartSettings&gt;&lt;SmartResize anchorLeft=&quot;Absolute&quot; anchorTop=&quot;Absolute&quot; anchorRight=&quot;None&quot; anchorBottom=&quot;None&quot; /&gt;&lt;/SmartSettings&gt;">
+                <a:extLst>
+                  <a:ext uri="{FF2B5EF4-FFF2-40B4-BE49-F238E27FC236}">
+                    <a16:creationId xmlns:a16="http://schemas.microsoft.com/office/drawing/2014/main" id="{A117792A-B642-4390-A1E8-7CAD0912569F}"/>
+                  </a:ext>
+                </a:extLst>
+              </p:cNvPr>
+              <p:cNvSpPr>
+                <a:spLocks noChangeAspect="1" noEditPoints="1"/>
+              </p:cNvSpPr>
+              <p:nvPr>
+                <p:custDataLst>
+                  <p:tags r:id="rId10"/>
+                </p:custDataLst>
+              </p:nvPr>
+            </p:nvSpPr>
+            <p:spPr bwMode="auto">
+              <a:xfrm>
+                <a:off x="987224" y="1539548"/>
+                <a:ext cx="102145" cy="173605"/>
+              </a:xfrm>
+              <a:custGeom>
+                <a:avLst/>
+                <a:gdLst>
+                  <a:gd name="T0" fmla="*/ 441 w 441"/>
+                  <a:gd name="T1" fmla="*/ 7 h 474"/>
+                  <a:gd name="T2" fmla="*/ 441 w 441"/>
+                  <a:gd name="T3" fmla="*/ 144 h 474"/>
+                  <a:gd name="T4" fmla="*/ 296 w 441"/>
+                  <a:gd name="T5" fmla="*/ 144 h 474"/>
+                  <a:gd name="T6" fmla="*/ 438 w 441"/>
+                  <a:gd name="T7" fmla="*/ 309 h 474"/>
+                  <a:gd name="T8" fmla="*/ 166 w 441"/>
+                  <a:gd name="T9" fmla="*/ 434 h 474"/>
+                  <a:gd name="T10" fmla="*/ 41 w 441"/>
+                  <a:gd name="T11" fmla="*/ 162 h 474"/>
+                  <a:gd name="T12" fmla="*/ 313 w 441"/>
+                  <a:gd name="T13" fmla="*/ 37 h 474"/>
+                  <a:gd name="T14" fmla="*/ 428 w 441"/>
+                  <a:gd name="T15" fmla="*/ 139 h 474"/>
+                </a:gdLst>
+                <a:ahLst/>
+                <a:cxnLst>
+                  <a:cxn ang="0">
+                    <a:pos x="T0" y="T1"/>
+                  </a:cxn>
+                  <a:cxn ang="0">
+                    <a:pos x="T2" y="T3"/>
+                  </a:cxn>
+                  <a:cxn ang="0">
+                    <a:pos x="T4" y="T5"/>
+                  </a:cxn>
+                  <a:cxn ang="0">
+                    <a:pos x="T6" y="T7"/>
+                  </a:cxn>
+                  <a:cxn ang="0">
+                    <a:pos x="T8" y="T9"/>
+                  </a:cxn>
+                  <a:cxn ang="0">
+                    <a:pos x="T10" y="T11"/>
+                  </a:cxn>
+                  <a:cxn ang="0">
+                    <a:pos x="T12" y="T13"/>
+                  </a:cxn>
+                  <a:cxn ang="0">
+                    <a:pos x="T14" y="T15"/>
+                  </a:cxn>
+                </a:cxnLst>
+                <a:rect l="0" t="0" r="r" b="b"/>
+                <a:pathLst>
+                  <a:path w="441" h="474">
+                    <a:moveTo>
+                      <a:pt x="441" y="7"/>
+                    </a:moveTo>
+                    <a:lnTo>
+                      <a:pt x="441" y="144"/>
+                    </a:lnTo>
+                    <a:lnTo>
+                      <a:pt x="296" y="144"/>
+                    </a:lnTo>
+                    <a:moveTo>
+                      <a:pt x="438" y="309"/>
+                    </a:moveTo>
+                    <a:cubicBezTo>
+                      <a:pt x="397" y="418"/>
+                      <a:pt x="276" y="474"/>
+                      <a:pt x="166" y="434"/>
+                    </a:cubicBezTo>
+                    <a:cubicBezTo>
+                      <a:pt x="56" y="393"/>
+                      <a:pt x="0" y="271"/>
+                      <a:pt x="41" y="162"/>
+                    </a:cubicBezTo>
+                    <a:cubicBezTo>
+                      <a:pt x="82" y="52"/>
+                      <a:pt x="202" y="0"/>
+                      <a:pt x="313" y="37"/>
+                    </a:cubicBezTo>
+                    <a:cubicBezTo>
+                      <a:pt x="357" y="51"/>
+                      <a:pt x="398" y="91"/>
+                      <a:pt x="428" y="139"/>
+                    </a:cubicBezTo>
+                  </a:path>
+                </a:pathLst>
+              </a:custGeom>
+              <a:noFill/>
+              <a:ln w="6350" cap="flat">
+                <a:solidFill>
+                  <a:srgbClr val="808080"/>
+                </a:solidFill>
+                <a:prstDash val="solid"/>
+                <a:miter lim="800000"/>
+                <a:headEnd/>
+                <a:tailEnd/>
+              </a:ln>
+              <a:extLst>
+                <a:ext uri="{909E8E84-426E-40DD-AFC4-6F175D3DCCD1}">
+                  <a14:hiddenFill xmlns:a14="http://schemas.microsoft.com/office/drawing/2010/main">
+                    <a:solidFill>
+                      <a:srgbClr val="FFFFFF"/>
+                    </a:solidFill>
+                  </a14:hiddenFill>
+                </a:ext>
+              </a:extLst>
+            </p:spPr>
+            <p:txBody>
+              <a:bodyPr vert="horz" wrap="square" lIns="91440" tIns="45720" rIns="91440" bIns="45720" numCol="1" anchor="t" anchorCtr="0" compatLnSpc="1">
+                <a:prstTxWarp prst="textNoShape">
+                  <a:avLst/>
+                </a:prstTxWarp>
+              </a:bodyPr>
+              <a:lstStyle>
+                <a:defPPr>
+                  <a:defRPr lang="en-US"/>
+                </a:defPPr>
+                <a:lvl1pPr marL="0" algn="l" defTabSz="914400" rtl="0" eaLnBrk="1" latinLnBrk="0" hangingPunct="1">
+                  <a:defRPr sz="1800" kern="1200">
+                    <a:solidFill>
+                      <a:schemeClr val="tx1"/>
+                    </a:solidFill>
+                    <a:latin typeface="+mn-lt"/>
+                    <a:ea typeface="+mn-ea"/>
+                    <a:cs typeface="+mn-cs"/>
+                  </a:defRPr>
+                </a:lvl1pPr>
+                <a:lvl2pPr marL="457200" algn="l" defTabSz="914400" rtl="0" eaLnBrk="1" latinLnBrk="0" hangingPunct="1">
+                  <a:defRPr sz="1800" kern="1200">
+                    <a:solidFill>
+                      <a:schemeClr val="tx1"/>
+                    </a:solidFill>
+                    <a:latin typeface="+mn-lt"/>
+                    <a:ea typeface="+mn-ea"/>
+                    <a:cs typeface="+mn-cs"/>
+                  </a:defRPr>
+                </a:lvl2pPr>
+                <a:lvl3pPr marL="914400" algn="l" defTabSz="914400" rtl="0" eaLnBrk="1" latinLnBrk="0" hangingPunct="1">
+                  <a:defRPr sz="1800" kern="1200">
+                    <a:solidFill>
+                      <a:schemeClr val="tx1"/>
+                    </a:solidFill>
+                    <a:latin typeface="+mn-lt"/>
+                    <a:ea typeface="+mn-ea"/>
+                    <a:cs typeface="+mn-cs"/>
+                  </a:defRPr>
+                </a:lvl3pPr>
+                <a:lvl4pPr marL="1371600" algn="l" defTabSz="914400" rtl="0" eaLnBrk="1" latinLnBrk="0" hangingPunct="1">
+                  <a:defRPr sz="1800" kern="1200">
+                    <a:solidFill>
+                      <a:schemeClr val="tx1"/>
+                    </a:solidFill>
+                    <a:latin typeface="+mn-lt"/>
+                    <a:ea typeface="+mn-ea"/>
+                    <a:cs typeface="+mn-cs"/>
+                  </a:defRPr>
+                </a:lvl4pPr>
+                <a:lvl5pPr marL="1828800" algn="l" defTabSz="914400" rtl="0" eaLnBrk="1" latinLnBrk="0" hangingPunct="1">
+                  <a:defRPr sz="1800" kern="1200">
+                    <a:solidFill>
+                      <a:schemeClr val="tx1"/>
+                    </a:solidFill>
+                    <a:latin typeface="+mn-lt"/>
+                    <a:ea typeface="+mn-ea"/>
+                    <a:cs typeface="+mn-cs"/>
+                  </a:defRPr>
+                </a:lvl5pPr>
+                <a:lvl6pPr marL="2286000" algn="l" defTabSz="914400" rtl="0" eaLnBrk="1" latinLnBrk="0" hangingPunct="1">
+                  <a:defRPr sz="1800" kern="1200">
+                    <a:solidFill>
+                      <a:schemeClr val="tx1"/>
+                    </a:solidFill>
+                    <a:latin typeface="+mn-lt"/>
+                    <a:ea typeface="+mn-ea"/>
+                    <a:cs typeface="+mn-cs"/>
+                  </a:defRPr>
+                </a:lvl6pPr>
+                <a:lvl7pPr marL="2743200" algn="l" defTabSz="914400" rtl="0" eaLnBrk="1" latinLnBrk="0" hangingPunct="1">
+                  <a:defRPr sz="1800" kern="1200">
+                    <a:solidFill>
+                      <a:schemeClr val="tx1"/>
+                    </a:solidFill>
+                    <a:latin typeface="+mn-lt"/>
+                    <a:ea typeface="+mn-ea"/>
+                    <a:cs typeface="+mn-cs"/>
+                  </a:defRPr>
+                </a:lvl7pPr>
+                <a:lvl8pPr marL="3200400" algn="l" defTabSz="914400" rtl="0" eaLnBrk="1" latinLnBrk="0" hangingPunct="1">
+                  <a:defRPr sz="1800" kern="1200">
+                    <a:solidFill>
+                      <a:schemeClr val="tx1"/>
+                    </a:solidFill>
+                    <a:latin typeface="+mn-lt"/>
+                    <a:ea typeface="+mn-ea"/>
+                    <a:cs typeface="+mn-cs"/>
+                  </a:defRPr>
+                </a:lvl8pPr>
+                <a:lvl9pPr marL="3657600" algn="l" defTabSz="914400" rtl="0" eaLnBrk="1" latinLnBrk="0" hangingPunct="1">
+                  <a:defRPr sz="1800" kern="1200">
+                    <a:solidFill>
+                      <a:schemeClr val="tx1"/>
+                    </a:solidFill>
+                    <a:latin typeface="+mn-lt"/>
+                    <a:ea typeface="+mn-ea"/>
+                    <a:cs typeface="+mn-cs"/>
+                  </a:defRPr>
+                </a:lvl9pPr>
+              </a:lstStyle>
+              <a:p>
+                <a:endParaRPr lang="en-US">
+                  <a:solidFill>
+                    <a:srgbClr val="5F5F5F"/>
+                  </a:solidFill>
+                  <a:latin typeface="Segoe UI" panose="020B0502040204020203" pitchFamily="34" charset="0"/>
+                  <a:cs typeface="Segoe UI" panose="020B0502040204020203" pitchFamily="34" charset="0"/>
+                </a:endParaRPr>
+              </a:p>
+            </p:txBody>
+          </p:sp>
+        </p:grpSp>
+      </p:grpSp>
+      <p:pic>
+        <p:nvPicPr>
+          <p:cNvPr id="16" name="Content Placeholder 15" descr="A picture containing sitting, monitor, table, dark&#10;&#10;Description automatically generated">
+            <a:extLst>
+              <a:ext uri="{FF2B5EF4-FFF2-40B4-BE49-F238E27FC236}">
+                <a16:creationId xmlns:a16="http://schemas.microsoft.com/office/drawing/2014/main" id="{D4294B2A-012E-4FF9-9BBA-7835C282EB5B}"/>
+              </a:ext>
+            </a:extLst>
+          </p:cNvPr>
+          <p:cNvPicPr>
+            <a:picLocks noGrp="1" noChangeAspect="1"/>
+          </p:cNvPicPr>
+          <p:nvPr>
+            <p:ph sz="quarter" idx="13"/>
+          </p:nvPr>
+        </p:nvPicPr>
+        <p:blipFill>
+          <a:blip r:embed="rId12"/>
+          <a:stretch>
+            <a:fillRect/>
+          </a:stretch>
+        </p:blipFill>
+        <p:spPr>
+          <a:xfrm>
+            <a:off x="913773" y="2107244"/>
+            <a:ext cx="2597575" cy="1680784"/>
+          </a:xfrm>
+        </p:spPr>
+      </p:pic>
+    </p:spTree>
+    <p:extLst>
+      <p:ext uri="{BB962C8B-B14F-4D97-AF65-F5344CB8AC3E}">
+        <p14:creationId xmlns:p14="http://schemas.microsoft.com/office/powerpoint/2010/main" val="828523342"/>
+      </p:ext>
+    </p:extLst>
+  </p:cSld>
+  <p:clrMapOvr>
+    <a:masterClrMapping/>
+  </p:clrMapOvr>
+</p:sld>
+</file>
+
+<file path=ppt/tags/tag1.xml><?xml version="1.0" encoding="utf-8"?>
+<p:tagLst xmlns:a="http://schemas.openxmlformats.org/drawingml/2006/main" xmlns:r="http://schemas.openxmlformats.org/officeDocument/2006/relationships" xmlns:p="http://schemas.openxmlformats.org/presentationml/2006/main">
+  <p:tag name="SMARTSETTINGSHASH" val="PWOa7bLCMN/NfWse0OkDrDXWtXjrMvC+/KEnGxnzoq0="/>
+</p:tagLst>
+</file>
+
+<file path=ppt/tags/tag10.xml><?xml version="1.0" encoding="utf-8"?>
+<p:tagLst xmlns:a="http://schemas.openxmlformats.org/drawingml/2006/main" xmlns:r="http://schemas.openxmlformats.org/officeDocument/2006/relationships" xmlns:p="http://schemas.openxmlformats.org/presentationml/2006/main">
+  <p:tag name="SMARTSETTINGSHASH" val="IDSg7uxH1Z/iSOkBSMZyie/SGkHlLE2okQSpqFhp1Ac="/>
+</p:tagLst>
+</file>
+
+<file path=ppt/tags/tag2.xml><?xml version="1.0" encoding="utf-8"?>
+<p:tagLst xmlns:a="http://schemas.openxmlformats.org/drawingml/2006/main" xmlns:r="http://schemas.openxmlformats.org/officeDocument/2006/relationships" xmlns:p="http://schemas.openxmlformats.org/presentationml/2006/main">
+  <p:tag name="SMARTSETTINGSHASH" val="xZU/W0IqlvXPkJ37/hSWg5jSIFh0KZmI7sT1syyiYH8="/>
+</p:tagLst>
+</file>
+
+<file path=ppt/tags/tag3.xml><?xml version="1.0" encoding="utf-8"?>
+<p:tagLst xmlns:a="http://schemas.openxmlformats.org/drawingml/2006/main" xmlns:r="http://schemas.openxmlformats.org/officeDocument/2006/relationships" xmlns:p="http://schemas.openxmlformats.org/presentationml/2006/main">
+  <p:tag name="SMARTSETTINGSHASH" val="SB3bqgv5ghGJknk/m+/9EdPMDkanH9eNosaoBtCx42Q="/>
+</p:tagLst>
+</file>
+
+<file path=ppt/tags/tag4.xml><?xml version="1.0" encoding="utf-8"?>
+<p:tagLst xmlns:a="http://schemas.openxmlformats.org/drawingml/2006/main" xmlns:r="http://schemas.openxmlformats.org/officeDocument/2006/relationships" xmlns:p="http://schemas.openxmlformats.org/presentationml/2006/main">
+  <p:tag name="SMARTSETTINGSHASH" val="xscEFkRiZvbxLfN1YzQGPp4nKBgtuPrjp3QiTCcMWwM="/>
+</p:tagLst>
+</file>
+
+<file path=ppt/tags/tag5.xml><?xml version="1.0" encoding="utf-8"?>
+<p:tagLst xmlns:a="http://schemas.openxmlformats.org/drawingml/2006/main" xmlns:r="http://schemas.openxmlformats.org/officeDocument/2006/relationships" xmlns:p="http://schemas.openxmlformats.org/presentationml/2006/main">
+  <p:tag name="SMARTSETTINGSHASH" val="xscEFkRiZvbxLfN1YzQGPp4nKBgtuPrjp3QiTCcMWwM="/>
+</p:tagLst>
+</file>
+
+<file path=ppt/tags/tag6.xml><?xml version="1.0" encoding="utf-8"?>
+<p:tagLst xmlns:a="http://schemas.openxmlformats.org/drawingml/2006/main" xmlns:r="http://schemas.openxmlformats.org/officeDocument/2006/relationships" xmlns:p="http://schemas.openxmlformats.org/presentationml/2006/main">
+  <p:tag name="SMARTSETTINGSHASH" val="SB3bqgv5ghGJknk/m+/9EdPMDkanH9eNosaoBtCx42Q="/>
+</p:tagLst>
+</file>
+
+<file path=ppt/tags/tag7.xml><?xml version="1.0" encoding="utf-8"?>
+<p:tagLst xmlns:a="http://schemas.openxmlformats.org/drawingml/2006/main" xmlns:r="http://schemas.openxmlformats.org/officeDocument/2006/relationships" xmlns:p="http://schemas.openxmlformats.org/presentationml/2006/main">
+  <p:tag name="SMARTSETTINGSHASH" val="IDSg7uxH1Z/iSOkBSMZyie/SGkHlLE2okQSpqFhp1Ac="/>
+</p:tagLst>
+</file>
+
+<file path=ppt/tags/tag8.xml><?xml version="1.0" encoding="utf-8"?>
+<p:tagLst xmlns:a="http://schemas.openxmlformats.org/drawingml/2006/main" xmlns:r="http://schemas.openxmlformats.org/officeDocument/2006/relationships" xmlns:p="http://schemas.openxmlformats.org/presentationml/2006/main">
+  <p:tag name="SMARTSETTINGSHASH" val="IDSg7uxH1Z/iSOkBSMZyie/SGkHlLE2okQSpqFhp1Ac="/>
+</p:tagLst>
+</file>
+
+<file path=ppt/tags/tag9.xml><?xml version="1.0" encoding="utf-8"?>
+<p:tagLst xmlns:a="http://schemas.openxmlformats.org/drawingml/2006/main" xmlns:r="http://schemas.openxmlformats.org/officeDocument/2006/relationships" xmlns:p="http://schemas.openxmlformats.org/presentationml/2006/main">
+  <p:tag name="SMARTSETTINGSHASH" val="IDSg7uxH1Z/iSOkBSMZyie/SGkHlLE2okQSpqFhp1Ac="/>
+</p:tagLst>
 </file>
 
 <file path=ppt/theme/theme1.xml><?xml version="1.0" encoding="utf-8"?>

</xml_diff>